<commit_message>
updated heat pump slides
</commit_message>
<xml_diff>
--- a/model slides/heatpump.pptx
+++ b/model slides/heatpump.pptx
@@ -2,12 +2,12 @@
 <file path=ppt/presentation.xml><?xml version="1.0" encoding="utf-8"?>
 <p:presentation xmlns:a="http://schemas.openxmlformats.org/drawingml/2006/main" xmlns:r="http://schemas.openxmlformats.org/officeDocument/2006/relationships" xmlns:p="http://schemas.openxmlformats.org/presentationml/2006/main" saveSubsetFonts="1">
   <p:sldMasterIdLst>
-    <p:sldMasterId id="2147483648" r:id="rId1"/>
+    <p:sldMasterId id="2147483648" r:id="rId4"/>
   </p:sldMasterIdLst>
   <p:sldIdLst>
-    <p:sldId id="256" r:id="rId2"/>
-    <p:sldId id="258" r:id="rId3"/>
-    <p:sldId id="259" r:id="rId4"/>
+    <p:sldId id="256" r:id="rId5"/>
+    <p:sldId id="258" r:id="rId6"/>
+    <p:sldId id="259" r:id="rId7"/>
   </p:sldIdLst>
   <p:sldSz cx="12192000" cy="6858000"/>
   <p:notesSz cx="6858000" cy="9144000"/>
@@ -106,7 +106,97 @@
       </a:defRPr>
     </a:lvl9pPr>
   </p:defaultTextStyle>
+  <p:extLst>
+    <p:ext uri="{EFAFB233-063F-42B5-8137-9DF3F51BA10A}">
+      <p15:sldGuideLst xmlns:p15="http://schemas.microsoft.com/office/powerpoint/2012/main"/>
+    </p:ext>
+  </p:extLst>
 </p:presentation>
+</file>
+
+<file path=ppt/revisionInfo.xml><?xml version="1.0" encoding="utf-8"?>
+<p1510:revInfo xmlns:a="http://schemas.openxmlformats.org/drawingml/2006/main" xmlns:r="http://schemas.openxmlformats.org/officeDocument/2006/relationships" xmlns:p1510="http://schemas.microsoft.com/office/powerpoint/2015/10/main">
+  <p1510:revLst>
+    <p1510:client id="{EAC605AC-AB4F-4AC6-B849-E37422DC50CB}" v="288" dt="2022-07-14T15:58:52.591"/>
+    <p1510:client id="{F4620B83-ED4C-433B-BC9D-C37C32892B26}" v="20" dt="2022-07-14T08:54:09.124"/>
+  </p1510:revLst>
+</p1510:revInfo>
+</file>
+
+<file path=ppt/changesInfos/changesInfo1.xml><?xml version="1.0" encoding="utf-8"?>
+<pc:chgInfo xmlns:a="http://schemas.openxmlformats.org/drawingml/2006/main" xmlns:r="http://schemas.openxmlformats.org/officeDocument/2006/relationships" xmlns:ac="http://schemas.microsoft.com/office/drawing/2013/main/command" xmlns:pc="http://schemas.microsoft.com/office/powerpoint/2013/main/command">
+  <pc:docChgLst>
+    <pc:chgData name="Lucas Edward HSLU T&amp;A" userId="0b6f48ed-087d-452a-a0b3-4eb82d34cfa5" providerId="ADAL" clId="{EAC605AC-AB4F-4AC6-B849-E37422DC50CB}"/>
+    <pc:docChg chg="undo custSel modSld">
+      <pc:chgData name="Lucas Edward HSLU T&amp;A" userId="0b6f48ed-087d-452a-a0b3-4eb82d34cfa5" providerId="ADAL" clId="{EAC605AC-AB4F-4AC6-B849-E37422DC50CB}" dt="2022-07-14T16:01:39.006" v="928" actId="20577"/>
+      <pc:docMkLst>
+        <pc:docMk/>
+      </pc:docMkLst>
+      <pc:sldChg chg="modSp mod">
+        <pc:chgData name="Lucas Edward HSLU T&amp;A" userId="0b6f48ed-087d-452a-a0b3-4eb82d34cfa5" providerId="ADAL" clId="{EAC605AC-AB4F-4AC6-B849-E37422DC50CB}" dt="2022-07-14T15:39:25.233" v="115" actId="20577"/>
+        <pc:sldMkLst>
+          <pc:docMk/>
+          <pc:sldMk cId="1741774979" sldId="256"/>
+        </pc:sldMkLst>
+        <pc:spChg chg="mod">
+          <ac:chgData name="Lucas Edward HSLU T&amp;A" userId="0b6f48ed-087d-452a-a0b3-4eb82d34cfa5" providerId="ADAL" clId="{EAC605AC-AB4F-4AC6-B849-E37422DC50CB}" dt="2022-07-14T15:39:25.233" v="115" actId="20577"/>
+          <ac:spMkLst>
+            <pc:docMk/>
+            <pc:sldMk cId="1741774979" sldId="256"/>
+            <ac:spMk id="5" creationId="{4CDF34A6-A22D-A0F1-57D2-BD80A4E506A0}"/>
+          </ac:spMkLst>
+        </pc:spChg>
+      </pc:sldChg>
+      <pc:sldChg chg="addSp modSp mod">
+        <pc:chgData name="Lucas Edward HSLU T&amp;A" userId="0b6f48ed-087d-452a-a0b3-4eb82d34cfa5" providerId="ADAL" clId="{EAC605AC-AB4F-4AC6-B849-E37422DC50CB}" dt="2022-07-14T16:01:39.006" v="928" actId="20577"/>
+        <pc:sldMkLst>
+          <pc:docMk/>
+          <pc:sldMk cId="2248148988" sldId="259"/>
+        </pc:sldMkLst>
+        <pc:spChg chg="mod">
+          <ac:chgData name="Lucas Edward HSLU T&amp;A" userId="0b6f48ed-087d-452a-a0b3-4eb82d34cfa5" providerId="ADAL" clId="{EAC605AC-AB4F-4AC6-B849-E37422DC50CB}" dt="2022-07-14T15:57:54.949" v="356"/>
+          <ac:spMkLst>
+            <pc:docMk/>
+            <pc:sldMk cId="2248148988" sldId="259"/>
+            <ac:spMk id="5" creationId="{4CDF34A6-A22D-A0F1-57D2-BD80A4E506A0}"/>
+          </ac:spMkLst>
+        </pc:spChg>
+        <pc:spChg chg="add mod">
+          <ac:chgData name="Lucas Edward HSLU T&amp;A" userId="0b6f48ed-087d-452a-a0b3-4eb82d34cfa5" providerId="ADAL" clId="{EAC605AC-AB4F-4AC6-B849-E37422DC50CB}" dt="2022-07-14T16:01:39.006" v="928" actId="20577"/>
+          <ac:spMkLst>
+            <pc:docMk/>
+            <pc:sldMk cId="2248148988" sldId="259"/>
+            <ac:spMk id="6" creationId="{85A86AC5-A19F-1787-1153-C8640D9990BF}"/>
+          </ac:spMkLst>
+        </pc:spChg>
+      </pc:sldChg>
+    </pc:docChg>
+  </pc:docChgLst>
+  <pc:docChgLst>
+    <pc:chgData name="Hendry Reto HSLU T&amp;A" userId="a1233879-0840-440b-896e-145c622bbd02" providerId="ADAL" clId="{F4620B83-ED4C-433B-BC9D-C37C32892B26}"/>
+    <pc:docChg chg="undo custSel modSld">
+      <pc:chgData name="Hendry Reto HSLU T&amp;A" userId="a1233879-0840-440b-896e-145c622bbd02" providerId="ADAL" clId="{F4620B83-ED4C-433B-BC9D-C37C32892B26}" dt="2022-07-14T08:54:09.124" v="18"/>
+      <pc:docMkLst>
+        <pc:docMk/>
+      </pc:docMkLst>
+      <pc:sldChg chg="modSp mod">
+        <pc:chgData name="Hendry Reto HSLU T&amp;A" userId="a1233879-0840-440b-896e-145c622bbd02" providerId="ADAL" clId="{F4620B83-ED4C-433B-BC9D-C37C32892B26}" dt="2022-07-14T08:54:09.124" v="18"/>
+        <pc:sldMkLst>
+          <pc:docMk/>
+          <pc:sldMk cId="1741774979" sldId="256"/>
+        </pc:sldMkLst>
+        <pc:spChg chg="mod">
+          <ac:chgData name="Hendry Reto HSLU T&amp;A" userId="a1233879-0840-440b-896e-145c622bbd02" providerId="ADAL" clId="{F4620B83-ED4C-433B-BC9D-C37C32892B26}" dt="2022-07-14T08:54:09.124" v="18"/>
+          <ac:spMkLst>
+            <pc:docMk/>
+            <pc:sldMk cId="1741774979" sldId="256"/>
+            <ac:spMk id="5" creationId="{4CDF34A6-A22D-A0F1-57D2-BD80A4E506A0}"/>
+          </ac:spMkLst>
+        </pc:spChg>
+      </pc:sldChg>
+    </pc:docChg>
+  </pc:docChgLst>
+</pc:chgInfo>
 </file>
 
 <file path=ppt/slideLayouts/slideLayout1.xml><?xml version="1.0" encoding="utf-8"?>
@@ -258,7 +348,7 @@
           <a:p>
             <a:fld id="{1945E603-6FD8-4E82-AA66-1D498947CA43}" type="datetimeFigureOut">
               <a:rPr lang="en-CH" smtClean="0"/>
-              <a:t>11/07/2022</a:t>
+              <a:t>07/14/2022</a:t>
             </a:fld>
             <a:endParaRPr lang="en-CH"/>
           </a:p>
@@ -458,7 +548,7 @@
           <a:p>
             <a:fld id="{1945E603-6FD8-4E82-AA66-1D498947CA43}" type="datetimeFigureOut">
               <a:rPr lang="en-CH" smtClean="0"/>
-              <a:t>11/07/2022</a:t>
+              <a:t>07/14/2022</a:t>
             </a:fld>
             <a:endParaRPr lang="en-CH"/>
           </a:p>
@@ -668,7 +758,7 @@
           <a:p>
             <a:fld id="{1945E603-6FD8-4E82-AA66-1D498947CA43}" type="datetimeFigureOut">
               <a:rPr lang="en-CH" smtClean="0"/>
-              <a:t>11/07/2022</a:t>
+              <a:t>07/14/2022</a:t>
             </a:fld>
             <a:endParaRPr lang="en-CH"/>
           </a:p>
@@ -868,7 +958,7 @@
           <a:p>
             <a:fld id="{1945E603-6FD8-4E82-AA66-1D498947CA43}" type="datetimeFigureOut">
               <a:rPr lang="en-CH" smtClean="0"/>
-              <a:t>11/07/2022</a:t>
+              <a:t>07/14/2022</a:t>
             </a:fld>
             <a:endParaRPr lang="en-CH"/>
           </a:p>
@@ -1144,7 +1234,7 @@
           <a:p>
             <a:fld id="{1945E603-6FD8-4E82-AA66-1D498947CA43}" type="datetimeFigureOut">
               <a:rPr lang="en-CH" smtClean="0"/>
-              <a:t>11/07/2022</a:t>
+              <a:t>07/14/2022</a:t>
             </a:fld>
             <a:endParaRPr lang="en-CH"/>
           </a:p>
@@ -1412,7 +1502,7 @@
           <a:p>
             <a:fld id="{1945E603-6FD8-4E82-AA66-1D498947CA43}" type="datetimeFigureOut">
               <a:rPr lang="en-CH" smtClean="0"/>
-              <a:t>11/07/2022</a:t>
+              <a:t>07/14/2022</a:t>
             </a:fld>
             <a:endParaRPr lang="en-CH"/>
           </a:p>
@@ -1827,7 +1917,7 @@
           <a:p>
             <a:fld id="{1945E603-6FD8-4E82-AA66-1D498947CA43}" type="datetimeFigureOut">
               <a:rPr lang="en-CH" smtClean="0"/>
-              <a:t>11/07/2022</a:t>
+              <a:t>07/14/2022</a:t>
             </a:fld>
             <a:endParaRPr lang="en-CH"/>
           </a:p>
@@ -1969,7 +2059,7 @@
           <a:p>
             <a:fld id="{1945E603-6FD8-4E82-AA66-1D498947CA43}" type="datetimeFigureOut">
               <a:rPr lang="en-CH" smtClean="0"/>
-              <a:t>11/07/2022</a:t>
+              <a:t>07/14/2022</a:t>
             </a:fld>
             <a:endParaRPr lang="en-CH"/>
           </a:p>
@@ -2082,7 +2172,7 @@
           <a:p>
             <a:fld id="{1945E603-6FD8-4E82-AA66-1D498947CA43}" type="datetimeFigureOut">
               <a:rPr lang="en-CH" smtClean="0"/>
-              <a:t>11/07/2022</a:t>
+              <a:t>07/14/2022</a:t>
             </a:fld>
             <a:endParaRPr lang="en-CH"/>
           </a:p>
@@ -2395,7 +2485,7 @@
           <a:p>
             <a:fld id="{1945E603-6FD8-4E82-AA66-1D498947CA43}" type="datetimeFigureOut">
               <a:rPr lang="en-CH" smtClean="0"/>
-              <a:t>11/07/2022</a:t>
+              <a:t>07/14/2022</a:t>
             </a:fld>
             <a:endParaRPr lang="en-CH"/>
           </a:p>
@@ -2684,7 +2774,7 @@
           <a:p>
             <a:fld id="{1945E603-6FD8-4E82-AA66-1D498947CA43}" type="datetimeFigureOut">
               <a:rPr lang="en-CH" smtClean="0"/>
-              <a:t>11/07/2022</a:t>
+              <a:t>07/14/2022</a:t>
             </a:fld>
             <a:endParaRPr lang="en-CH"/>
           </a:p>
@@ -2927,7 +3017,7 @@
           <a:p>
             <a:fld id="{1945E603-6FD8-4E82-AA66-1D498947CA43}" type="datetimeFigureOut">
               <a:rPr lang="en-CH" smtClean="0"/>
-              <a:t>11/07/2022</a:t>
+              <a:t>07/14/2022</a:t>
             </a:fld>
             <a:endParaRPr lang="en-CH"/>
           </a:p>
@@ -3459,18 +3549,6 @@
                         </a:rPr>
                         <m:t>=</m:t>
                       </m:r>
-                      <m:r>
-                        <a:rPr lang="en-GB" sz="1800" b="0" i="1" smtClean="0">
-                          <a:latin typeface="Cambria Math" panose="02040503050406030204" pitchFamily="18" charset="0"/>
-                        </a:rPr>
-                        <m:t>1</m:t>
-                      </m:r>
-                      <m:r>
-                        <a:rPr lang="en-GB" sz="1800" b="0" i="1" smtClean="0">
-                          <a:latin typeface="Cambria Math" panose="02040503050406030204" pitchFamily="18" charset="0"/>
-                        </a:rPr>
-                        <m:t>−</m:t>
-                      </m:r>
                       <m:f>
                         <m:fPr>
                           <m:ctrlPr>
@@ -3498,10 +3576,10 @@
                             </m:e>
                             <m:sub>
                               <m:r>
-                                <a:rPr lang="en-GB" sz="1800" b="0" i="1" smtClean="0">
+                                <a:rPr lang="de-CH" sz="1800" b="0" i="1" smtClean="0">
                                   <a:latin typeface="Cambria Math" panose="02040503050406030204" pitchFamily="18" charset="0"/>
                                 </a:rPr>
-                                <m:t>𝑉</m:t>
+                                <m:t>𝐾</m:t>
                               </m:r>
                             </m:sub>
                           </m:sSub>
@@ -3529,6 +3607,37 @@
                                   <a:latin typeface="Cambria Math" panose="02040503050406030204" pitchFamily="18" charset="0"/>
                                 </a:rPr>
                                 <m:t>𝐾</m:t>
+                              </m:r>
+                            </m:sub>
+                          </m:sSub>
+                          <m:r>
+                            <a:rPr lang="de-CH" sz="1800" b="0" i="1" smtClean="0">
+                              <a:latin typeface="Cambria Math" panose="02040503050406030204" pitchFamily="18" charset="0"/>
+                            </a:rPr>
+                            <m:t>−</m:t>
+                          </m:r>
+                          <m:sSub>
+                            <m:sSubPr>
+                              <m:ctrlPr>
+                                <a:rPr lang="en-GB" sz="1800" i="1">
+                                  <a:latin typeface="Cambria Math" panose="02040503050406030204" pitchFamily="18" charset="0"/>
+                                </a:rPr>
+                              </m:ctrlPr>
+                            </m:sSubPr>
+                            <m:e>
+                              <m:r>
+                                <a:rPr lang="en-GB" sz="1800" i="1">
+                                  <a:latin typeface="Cambria Math" panose="02040503050406030204" pitchFamily="18" charset="0"/>
+                                </a:rPr>
+                                <m:t>𝑇</m:t>
+                              </m:r>
+                            </m:e>
+                            <m:sub>
+                              <m:r>
+                                <a:rPr lang="en-GB" sz="1800" i="1">
+                                  <a:latin typeface="Cambria Math" panose="02040503050406030204" pitchFamily="18" charset="0"/>
+                                </a:rPr>
+                                <m:t>𝑉</m:t>
                               </m:r>
                             </m:sub>
                           </m:sSub>
@@ -3825,7 +3934,7 @@
                         <m:t>𝑃𝑒</m:t>
                       </m:r>
                       <m:r>
-                        <a:rPr lang="en-GB" sz="1800" b="0" i="1" baseline="-25000" smtClean="0">
+                        <a:rPr lang="de-CH" sz="1800" b="0" i="1" baseline="-25000" smtClean="0">
                           <a:latin typeface="Cambria Math" panose="02040503050406030204" pitchFamily="18" charset="0"/>
                         </a:rPr>
                         <m:t>𝑙</m:t>
@@ -4370,7 +4479,7 @@
                     <a:ea typeface="+mn-ea"/>
                     <a:cs typeface="+mn-cs"/>
                   </a:rPr>
-                  <a:t>): range of 0.4-0.55</a:t>
+                  <a:t>): of 0.4</a:t>
                 </a:r>
                 <a:endParaRPr kumimoji="0" lang="en-CH" sz="1200" b="0" i="0" u="none" strike="noStrike" kern="1200" cap="none" spc="0" normalizeH="0" baseline="0" noProof="0" dirty="0">
                   <a:ln>
@@ -4430,7 +4539,7 @@
               <a:lstStyle/>
               <a:p>
                 <a:r>
-                  <a:rPr lang="en-CH">
+                  <a:rPr lang="en-US">
                     <a:noFill/>
                   </a:rPr>
                   <a:t> </a:t>
@@ -6945,53 +7054,1984 @@
           </a:p>
         </p:txBody>
       </p:sp>
+      <mc:AlternateContent xmlns:mc="http://schemas.openxmlformats.org/markup-compatibility/2006">
+        <mc:Choice xmlns:a14="http://schemas.microsoft.com/office/drawing/2010/main" Requires="a14">
+          <p:sp>
+            <p:nvSpPr>
+              <p:cNvPr id="5" name="Content Placeholder 4">
+                <a:extLst>
+                  <a:ext uri="{FF2B5EF4-FFF2-40B4-BE49-F238E27FC236}">
+                    <a16:creationId xmlns:a16="http://schemas.microsoft.com/office/drawing/2014/main" id="{4CDF34A6-A22D-A0F1-57D2-BD80A4E506A0}"/>
+                  </a:ext>
+                </a:extLst>
+              </p:cNvPr>
+              <p:cNvSpPr>
+                <a:spLocks noGrp="1"/>
+              </p:cNvSpPr>
+              <p:nvPr>
+                <p:ph sz="half" idx="1"/>
+              </p:nvPr>
+            </p:nvSpPr>
+            <p:spPr/>
+            <p:txBody>
+              <a:bodyPr>
+                <a:normAutofit/>
+              </a:bodyPr>
+              <a:lstStyle/>
+              <a:p>
+                <a:r>
+                  <a:rPr lang="en-GB" sz="1800" dirty="0"/>
+                  <a:t>Governing equations:</a:t>
+                </a:r>
+              </a:p>
+              <a:p>
+                <a:pPr marL="0" indent="0">
+                  <a:buNone/>
+                </a:pPr>
+                <a:endParaRPr lang="en-GB" sz="1800" dirty="0"/>
+              </a:p>
+              <a:p>
+                <a:pPr marL="0" indent="0">
+                  <a:buNone/>
+                </a:pPr>
+                <a14:m>
+                  <m:oMathPara xmlns:m="http://schemas.openxmlformats.org/officeDocument/2006/math">
+                    <m:oMathParaPr>
+                      <m:jc m:val="centerGroup"/>
+                    </m:oMathParaPr>
+                    <m:oMath xmlns:m="http://schemas.openxmlformats.org/officeDocument/2006/math">
+                      <m:sSub>
+                        <m:sSubPr>
+                          <m:ctrlPr>
+                            <a:rPr lang="en-GB" sz="1800" b="0" i="1" smtClean="0">
+                              <a:latin typeface="Cambria Math" panose="02040503050406030204" pitchFamily="18" charset="0"/>
+                            </a:rPr>
+                          </m:ctrlPr>
+                        </m:sSubPr>
+                        <m:e>
+                          <m:acc>
+                            <m:accPr>
+                              <m:chr m:val="̇"/>
+                              <m:ctrlPr>
+                                <a:rPr lang="en-GB" sz="1800" b="0" i="1" smtClean="0">
+                                  <a:latin typeface="Cambria Math" panose="02040503050406030204" pitchFamily="18" charset="0"/>
+                                </a:rPr>
+                              </m:ctrlPr>
+                            </m:accPr>
+                            <m:e>
+                              <m:r>
+                                <a:rPr lang="en-GB" sz="1800" b="0" i="1" smtClean="0">
+                                  <a:latin typeface="Cambria Math" panose="02040503050406030204" pitchFamily="18" charset="0"/>
+                                </a:rPr>
+                                <m:t>𝑄</m:t>
+                              </m:r>
+                            </m:e>
+                          </m:acc>
+                        </m:e>
+                        <m:sub>
+                          <m:r>
+                            <a:rPr lang="en-GB" sz="1800" b="0" i="1" smtClean="0">
+                              <a:latin typeface="Cambria Math" panose="02040503050406030204" pitchFamily="18" charset="0"/>
+                            </a:rPr>
+                            <m:t>𝐾</m:t>
+                          </m:r>
+                        </m:sub>
+                      </m:sSub>
+                      <m:d>
+                        <m:dPr>
+                          <m:ctrlPr>
+                            <a:rPr lang="de-CH" sz="1800" b="0" i="1" smtClean="0">
+                              <a:latin typeface="Cambria Math" panose="02040503050406030204" pitchFamily="18" charset="0"/>
+                            </a:rPr>
+                          </m:ctrlPr>
+                        </m:dPr>
+                        <m:e>
+                          <m:sSub>
+                            <m:sSubPr>
+                              <m:ctrlPr>
+                                <a:rPr lang="en-GB" sz="1800" i="1">
+                                  <a:latin typeface="Cambria Math" panose="02040503050406030204" pitchFamily="18" charset="0"/>
+                                </a:rPr>
+                              </m:ctrlPr>
+                            </m:sSubPr>
+                            <m:e>
+                              <m:r>
+                                <a:rPr lang="en-GB" sz="1800" i="1">
+                                  <a:latin typeface="Cambria Math" panose="02040503050406030204" pitchFamily="18" charset="0"/>
+                                </a:rPr>
+                                <m:t>𝑇</m:t>
+                              </m:r>
+                            </m:e>
+                            <m:sub>
+                              <m:r>
+                                <a:rPr lang="de-CH" sz="1800" i="1">
+                                  <a:latin typeface="Cambria Math" panose="02040503050406030204" pitchFamily="18" charset="0"/>
+                                </a:rPr>
+                                <m:t>𝑎𝑖𝑟</m:t>
+                              </m:r>
+                            </m:sub>
+                          </m:sSub>
+                        </m:e>
+                      </m:d>
+                      <m:r>
+                        <a:rPr lang="de-CH" sz="1800" b="0" i="0" smtClean="0">
+                          <a:latin typeface="Cambria Math" panose="02040503050406030204" pitchFamily="18" charset="0"/>
+                        </a:rPr>
+                        <m:t>=</m:t>
+                      </m:r>
+                      <m:r>
+                        <a:rPr lang="de-CH" sz="1800" b="0" i="1" smtClean="0">
+                          <a:latin typeface="Cambria Math" panose="02040503050406030204" pitchFamily="18" charset="0"/>
+                        </a:rPr>
+                        <m:t>𝐶𝑂𝑃</m:t>
+                      </m:r>
+                      <m:d>
+                        <m:dPr>
+                          <m:ctrlPr>
+                            <a:rPr lang="de-CH" sz="1800" i="1">
+                              <a:latin typeface="Cambria Math" panose="02040503050406030204" pitchFamily="18" charset="0"/>
+                            </a:rPr>
+                          </m:ctrlPr>
+                        </m:dPr>
+                        <m:e>
+                          <m:sSub>
+                            <m:sSubPr>
+                              <m:ctrlPr>
+                                <a:rPr lang="en-GB" sz="1800" i="1">
+                                  <a:latin typeface="Cambria Math" panose="02040503050406030204" pitchFamily="18" charset="0"/>
+                                </a:rPr>
+                              </m:ctrlPr>
+                            </m:sSubPr>
+                            <m:e>
+                              <m:r>
+                                <a:rPr lang="en-GB" sz="1800" i="1">
+                                  <a:latin typeface="Cambria Math" panose="02040503050406030204" pitchFamily="18" charset="0"/>
+                                </a:rPr>
+                                <m:t>𝑇</m:t>
+                              </m:r>
+                            </m:e>
+                            <m:sub>
+                              <m:r>
+                                <a:rPr lang="de-CH" sz="1800" i="1">
+                                  <a:latin typeface="Cambria Math" panose="02040503050406030204" pitchFamily="18" charset="0"/>
+                                </a:rPr>
+                                <m:t>𝑎𝑖𝑟</m:t>
+                              </m:r>
+                            </m:sub>
+                          </m:sSub>
+                        </m:e>
+                      </m:d>
+                      <m:r>
+                        <a:rPr lang="de-CH" sz="1800" b="0" i="1" smtClean="0">
+                          <a:latin typeface="Cambria Math" panose="02040503050406030204" pitchFamily="18" charset="0"/>
+                        </a:rPr>
+                        <m:t>∗</m:t>
+                      </m:r>
+                      <m:r>
+                        <a:rPr lang="en-GB" sz="1800" i="1">
+                          <a:latin typeface="Cambria Math" panose="02040503050406030204" pitchFamily="18" charset="0"/>
+                        </a:rPr>
+                        <m:t>𝑃</m:t>
+                      </m:r>
+                      <m:r>
+                        <a:rPr lang="de-CH" sz="1800" i="1" baseline="-25000">
+                          <a:latin typeface="Cambria Math" panose="02040503050406030204" pitchFamily="18" charset="0"/>
+                        </a:rPr>
+                        <m:t>𝑒𝑙</m:t>
+                      </m:r>
+                    </m:oMath>
+                  </m:oMathPara>
+                </a14:m>
+                <a:endParaRPr lang="en-GB" sz="1800" dirty="0"/>
+              </a:p>
+              <a:p>
+                <a:pPr marL="0" indent="0">
+                  <a:buNone/>
+                </a:pPr>
+                <a14:m>
+                  <m:oMathPara xmlns:m="http://schemas.openxmlformats.org/officeDocument/2006/math">
+                    <m:oMathParaPr>
+                      <m:jc m:val="centerGroup"/>
+                    </m:oMathParaPr>
+                    <m:oMath xmlns:m="http://schemas.openxmlformats.org/officeDocument/2006/math">
+                      <m:r>
+                        <a:rPr lang="de-CH" sz="1800" b="0" i="1" smtClean="0">
+                          <a:latin typeface="Cambria Math" panose="02040503050406030204" pitchFamily="18" charset="0"/>
+                        </a:rPr>
+                        <m:t>𝐶𝑂𝑃</m:t>
+                      </m:r>
+                      <m:d>
+                        <m:dPr>
+                          <m:ctrlPr>
+                            <a:rPr lang="de-CH" sz="1800" i="1">
+                              <a:latin typeface="Cambria Math" panose="02040503050406030204" pitchFamily="18" charset="0"/>
+                            </a:rPr>
+                          </m:ctrlPr>
+                        </m:dPr>
+                        <m:e>
+                          <m:sSub>
+                            <m:sSubPr>
+                              <m:ctrlPr>
+                                <a:rPr lang="en-GB" sz="1800" i="1">
+                                  <a:latin typeface="Cambria Math" panose="02040503050406030204" pitchFamily="18" charset="0"/>
+                                </a:rPr>
+                              </m:ctrlPr>
+                            </m:sSubPr>
+                            <m:e>
+                              <m:r>
+                                <a:rPr lang="en-GB" sz="1800" i="1">
+                                  <a:latin typeface="Cambria Math" panose="02040503050406030204" pitchFamily="18" charset="0"/>
+                                </a:rPr>
+                                <m:t>𝑇</m:t>
+                              </m:r>
+                            </m:e>
+                            <m:sub>
+                              <m:r>
+                                <a:rPr lang="de-CH" sz="1800" i="1">
+                                  <a:latin typeface="Cambria Math" panose="02040503050406030204" pitchFamily="18" charset="0"/>
+                                </a:rPr>
+                                <m:t>𝑎𝑖𝑟</m:t>
+                              </m:r>
+                            </m:sub>
+                          </m:sSub>
+                        </m:e>
+                      </m:d>
+                      <m:r>
+                        <a:rPr lang="de-CH" sz="1800" b="0" i="1" smtClean="0">
+                          <a:latin typeface="Cambria Math" panose="02040503050406030204" pitchFamily="18" charset="0"/>
+                        </a:rPr>
+                        <m:t>=</m:t>
+                      </m:r>
+                      <m:sSub>
+                        <m:sSubPr>
+                          <m:ctrlPr>
+                            <a:rPr lang="en-GB" sz="1800" i="1">
+                              <a:latin typeface="Cambria Math" panose="02040503050406030204" pitchFamily="18" charset="0"/>
+                            </a:rPr>
+                          </m:ctrlPr>
+                        </m:sSubPr>
+                        <m:e>
+                          <m:acc>
+                            <m:accPr>
+                              <m:chr m:val="̇"/>
+                              <m:ctrlPr>
+                                <a:rPr lang="en-GB" sz="1800" i="1">
+                                  <a:latin typeface="Cambria Math" panose="02040503050406030204" pitchFamily="18" charset="0"/>
+                                </a:rPr>
+                              </m:ctrlPr>
+                            </m:accPr>
+                            <m:e>
+                              <m:r>
+                                <a:rPr lang="en-GB" sz="1800" i="1">
+                                  <a:latin typeface="Cambria Math" panose="02040503050406030204" pitchFamily="18" charset="0"/>
+                                </a:rPr>
+                                <m:t>𝑄</m:t>
+                              </m:r>
+                            </m:e>
+                          </m:acc>
+                        </m:e>
+                        <m:sub>
+                          <m:r>
+                            <a:rPr lang="en-GB" sz="1800" i="1">
+                              <a:latin typeface="Cambria Math" panose="02040503050406030204" pitchFamily="18" charset="0"/>
+                            </a:rPr>
+                            <m:t>𝐾</m:t>
+                          </m:r>
+                        </m:sub>
+                      </m:sSub>
+                      <m:d>
+                        <m:dPr>
+                          <m:ctrlPr>
+                            <a:rPr lang="de-CH" sz="1800" i="1">
+                              <a:latin typeface="Cambria Math" panose="02040503050406030204" pitchFamily="18" charset="0"/>
+                            </a:rPr>
+                          </m:ctrlPr>
+                        </m:dPr>
+                        <m:e>
+                          <m:sSub>
+                            <m:sSubPr>
+                              <m:ctrlPr>
+                                <a:rPr lang="en-GB" sz="1800" i="1">
+                                  <a:latin typeface="Cambria Math" panose="02040503050406030204" pitchFamily="18" charset="0"/>
+                                </a:rPr>
+                              </m:ctrlPr>
+                            </m:sSubPr>
+                            <m:e>
+                              <m:r>
+                                <a:rPr lang="en-GB" sz="1800" i="1">
+                                  <a:latin typeface="Cambria Math" panose="02040503050406030204" pitchFamily="18" charset="0"/>
+                                </a:rPr>
+                                <m:t>𝑇</m:t>
+                              </m:r>
+                            </m:e>
+                            <m:sub>
+                              <m:r>
+                                <a:rPr lang="de-CH" sz="1800" i="1">
+                                  <a:latin typeface="Cambria Math" panose="02040503050406030204" pitchFamily="18" charset="0"/>
+                                </a:rPr>
+                                <m:t>𝑎𝑖𝑟</m:t>
+                              </m:r>
+                            </m:sub>
+                          </m:sSub>
+                        </m:e>
+                      </m:d>
+                      <m:r>
+                        <a:rPr lang="de-CH" sz="1800" b="0" i="1" smtClean="0">
+                          <a:latin typeface="Cambria Math" panose="02040503050406030204" pitchFamily="18" charset="0"/>
+                        </a:rPr>
+                        <m:t>/</m:t>
+                      </m:r>
+                      <m:r>
+                        <a:rPr lang="en-GB" sz="1800" i="1">
+                          <a:latin typeface="Cambria Math" panose="02040503050406030204" pitchFamily="18" charset="0"/>
+                        </a:rPr>
+                        <m:t>𝑃</m:t>
+                      </m:r>
+                      <m:r>
+                        <a:rPr lang="de-CH" sz="1800" i="1" baseline="-25000">
+                          <a:latin typeface="Cambria Math" panose="02040503050406030204" pitchFamily="18" charset="0"/>
+                        </a:rPr>
+                        <m:t>𝑒𝑙</m:t>
+                      </m:r>
+                    </m:oMath>
+                  </m:oMathPara>
+                </a14:m>
+                <a:endParaRPr lang="en-GB" sz="1800" dirty="0"/>
+              </a:p>
+              <a:p>
+                <a:pPr marL="0" indent="0">
+                  <a:buNone/>
+                </a:pPr>
+                <a:endParaRPr lang="en-GB" sz="1800" dirty="0"/>
+              </a:p>
+              <a:p>
+                <a:pPr marL="0" indent="0">
+                  <a:buNone/>
+                </a:pPr>
+                <a14:m>
+                  <m:oMathPara xmlns:m="http://schemas.openxmlformats.org/officeDocument/2006/math">
+                    <m:oMathParaPr>
+                      <m:jc m:val="centerGroup"/>
+                    </m:oMathParaPr>
+                    <m:oMath xmlns:m="http://schemas.openxmlformats.org/officeDocument/2006/math">
+                      <m:r>
+                        <a:rPr lang="de-CH" sz="1800" i="1" smtClean="0">
+                          <a:latin typeface="Cambria Math" panose="02040503050406030204" pitchFamily="18" charset="0"/>
+                        </a:rPr>
+                        <m:t>𝛿</m:t>
+                      </m:r>
+                      <m:r>
+                        <a:rPr lang="de-CH" sz="1800" i="1" smtClean="0">
+                          <a:latin typeface="Cambria Math" panose="02040503050406030204" pitchFamily="18" charset="0"/>
+                        </a:rPr>
+                        <m:t>𝐶𝑂𝑃</m:t>
+                      </m:r>
+                      <m:d>
+                        <m:dPr>
+                          <m:ctrlPr>
+                            <a:rPr lang="de-CH" sz="1800" i="1">
+                              <a:latin typeface="Cambria Math" panose="02040503050406030204" pitchFamily="18" charset="0"/>
+                            </a:rPr>
+                          </m:ctrlPr>
+                        </m:dPr>
+                        <m:e>
+                          <m:sSub>
+                            <m:sSubPr>
+                              <m:ctrlPr>
+                                <a:rPr lang="en-GB" sz="1800" i="1">
+                                  <a:latin typeface="Cambria Math" panose="02040503050406030204" pitchFamily="18" charset="0"/>
+                                </a:rPr>
+                              </m:ctrlPr>
+                            </m:sSubPr>
+                            <m:e>
+                              <m:r>
+                                <a:rPr lang="en-GB" sz="1800" i="1">
+                                  <a:latin typeface="Cambria Math" panose="02040503050406030204" pitchFamily="18" charset="0"/>
+                                </a:rPr>
+                                <m:t>𝑇</m:t>
+                              </m:r>
+                            </m:e>
+                            <m:sub>
+                              <m:r>
+                                <a:rPr lang="de-CH" sz="1800" i="1">
+                                  <a:latin typeface="Cambria Math" panose="02040503050406030204" pitchFamily="18" charset="0"/>
+                                </a:rPr>
+                                <m:t>𝑎𝑖𝑟</m:t>
+                              </m:r>
+                            </m:sub>
+                          </m:sSub>
+                        </m:e>
+                      </m:d>
+                      <m:r>
+                        <a:rPr lang="de-CH" sz="1800" b="0" i="0" smtClean="0">
+                          <a:latin typeface="Cambria Math" panose="02040503050406030204" pitchFamily="18" charset="0"/>
+                        </a:rPr>
+                        <m:t>=</m:t>
+                      </m:r>
+                      <m:r>
+                        <a:rPr lang="de-CH" sz="1800" i="1">
+                          <a:latin typeface="Cambria Math" panose="02040503050406030204" pitchFamily="18" charset="0"/>
+                        </a:rPr>
+                        <m:t>𝐶</m:t>
+                      </m:r>
+                      <m:r>
+                        <a:rPr lang="de-CH" sz="1800" b="0" i="1" smtClean="0">
+                          <a:latin typeface="Cambria Math" panose="02040503050406030204" pitchFamily="18" charset="0"/>
+                        </a:rPr>
+                        <m:t>𝑂𝑃</m:t>
+                      </m:r>
+                      <m:d>
+                        <m:dPr>
+                          <m:ctrlPr>
+                            <a:rPr lang="de-CH" sz="1800" i="1">
+                              <a:latin typeface="Cambria Math" panose="02040503050406030204" pitchFamily="18" charset="0"/>
+                            </a:rPr>
+                          </m:ctrlPr>
+                        </m:dPr>
+                        <m:e>
+                          <m:sSub>
+                            <m:sSubPr>
+                              <m:ctrlPr>
+                                <a:rPr lang="en-GB" sz="1800" i="1">
+                                  <a:latin typeface="Cambria Math" panose="02040503050406030204" pitchFamily="18" charset="0"/>
+                                </a:rPr>
+                              </m:ctrlPr>
+                            </m:sSubPr>
+                            <m:e>
+                              <m:r>
+                                <a:rPr lang="en-GB" sz="1800" i="1">
+                                  <a:latin typeface="Cambria Math" panose="02040503050406030204" pitchFamily="18" charset="0"/>
+                                </a:rPr>
+                                <m:t>𝑇</m:t>
+                              </m:r>
+                            </m:e>
+                            <m:sub>
+                              <m:r>
+                                <a:rPr lang="de-CH" sz="1800" i="1">
+                                  <a:latin typeface="Cambria Math" panose="02040503050406030204" pitchFamily="18" charset="0"/>
+                                </a:rPr>
+                                <m:t>𝑎𝑖𝑟</m:t>
+                              </m:r>
+                            </m:sub>
+                          </m:sSub>
+                        </m:e>
+                      </m:d>
+                      <m:sSub>
+                        <m:sSubPr>
+                          <m:ctrlPr>
+                            <a:rPr lang="en-GB" sz="1800" i="1">
+                              <a:latin typeface="Cambria Math" panose="02040503050406030204" pitchFamily="18" charset="0"/>
+                            </a:rPr>
+                          </m:ctrlPr>
+                        </m:sSubPr>
+                        <m:e>
+                          <m:r>
+                            <a:rPr lang="de-CH" sz="1800" i="1">
+                              <a:latin typeface="Cambria Math" panose="02040503050406030204" pitchFamily="18" charset="0"/>
+                            </a:rPr>
+                            <m:t>−</m:t>
+                          </m:r>
+                          <m:r>
+                            <a:rPr lang="en-GB" sz="1800" i="1">
+                              <a:latin typeface="Cambria Math" panose="02040503050406030204" pitchFamily="18" charset="0"/>
+                            </a:rPr>
+                            <m:t>𝐶𝑂𝑃</m:t>
+                          </m:r>
+                        </m:e>
+                        <m:sub>
+                          <m:r>
+                            <a:rPr lang="en-GB" sz="1800" i="1">
+                              <a:latin typeface="Cambria Math" panose="02040503050406030204" pitchFamily="18" charset="0"/>
+                            </a:rPr>
+                            <m:t>𝑟𝑒𝑎𝑙</m:t>
+                          </m:r>
+                        </m:sub>
+                      </m:sSub>
+                      <m:r>
+                        <a:rPr lang="de-CH" sz="1800" b="0" i="1" smtClean="0">
+                          <a:latin typeface="Cambria Math" panose="02040503050406030204" pitchFamily="18" charset="0"/>
+                        </a:rPr>
+                        <m:t>=</m:t>
+                      </m:r>
+                    </m:oMath>
+                  </m:oMathPara>
+                </a14:m>
+                <a:endParaRPr lang="de-CH" sz="1800" b="0" i="1" dirty="0">
+                  <a:latin typeface="Cambria Math" panose="02040503050406030204" pitchFamily="18" charset="0"/>
+                </a:endParaRPr>
+              </a:p>
+              <a:p>
+                <a:pPr marL="0" indent="0">
+                  <a:buNone/>
+                </a:pPr>
+                <a14:m>
+                  <m:oMathPara xmlns:m="http://schemas.openxmlformats.org/officeDocument/2006/math">
+                    <m:oMathParaPr>
+                      <m:jc m:val="centerGroup"/>
+                    </m:oMathParaPr>
+                    <m:oMath xmlns:m="http://schemas.openxmlformats.org/officeDocument/2006/math">
+                      <m:f>
+                        <m:fPr>
+                          <m:ctrlPr>
+                            <a:rPr lang="de-CH" sz="1800" i="1">
+                              <a:latin typeface="Cambria Math" panose="02040503050406030204" pitchFamily="18" charset="0"/>
+                            </a:rPr>
+                          </m:ctrlPr>
+                        </m:fPr>
+                        <m:num>
+                          <m:sSub>
+                            <m:sSubPr>
+                              <m:ctrlPr>
+                                <a:rPr lang="en-GB" sz="1800" i="1">
+                                  <a:latin typeface="Cambria Math" panose="02040503050406030204" pitchFamily="18" charset="0"/>
+                                </a:rPr>
+                              </m:ctrlPr>
+                            </m:sSubPr>
+                            <m:e>
+                              <m:acc>
+                                <m:accPr>
+                                  <m:chr m:val="̇"/>
+                                  <m:ctrlPr>
+                                    <a:rPr lang="en-GB" sz="1800" i="1">
+                                      <a:latin typeface="Cambria Math" panose="02040503050406030204" pitchFamily="18" charset="0"/>
+                                    </a:rPr>
+                                  </m:ctrlPr>
+                                </m:accPr>
+                                <m:e>
+                                  <m:r>
+                                    <a:rPr lang="en-GB" sz="1800" i="1">
+                                      <a:latin typeface="Cambria Math" panose="02040503050406030204" pitchFamily="18" charset="0"/>
+                                    </a:rPr>
+                                    <m:t>𝑄</m:t>
+                                  </m:r>
+                                </m:e>
+                              </m:acc>
+                            </m:e>
+                            <m:sub>
+                              <m:r>
+                                <a:rPr lang="en-GB" sz="1800" i="1">
+                                  <a:latin typeface="Cambria Math" panose="02040503050406030204" pitchFamily="18" charset="0"/>
+                                </a:rPr>
+                                <m:t>𝐾</m:t>
+                              </m:r>
+                            </m:sub>
+                          </m:sSub>
+                          <m:d>
+                            <m:dPr>
+                              <m:ctrlPr>
+                                <a:rPr lang="de-CH" sz="1800" i="1">
+                                  <a:latin typeface="Cambria Math" panose="02040503050406030204" pitchFamily="18" charset="0"/>
+                                </a:rPr>
+                              </m:ctrlPr>
+                            </m:dPr>
+                            <m:e>
+                              <m:sSub>
+                                <m:sSubPr>
+                                  <m:ctrlPr>
+                                    <a:rPr lang="en-GB" sz="1800" i="1">
+                                      <a:latin typeface="Cambria Math" panose="02040503050406030204" pitchFamily="18" charset="0"/>
+                                    </a:rPr>
+                                  </m:ctrlPr>
+                                </m:sSubPr>
+                                <m:e>
+                                  <m:r>
+                                    <a:rPr lang="en-GB" sz="1800" i="1">
+                                      <a:latin typeface="Cambria Math" panose="02040503050406030204" pitchFamily="18" charset="0"/>
+                                    </a:rPr>
+                                    <m:t>𝑇</m:t>
+                                  </m:r>
+                                </m:e>
+                                <m:sub>
+                                  <m:r>
+                                    <a:rPr lang="de-CH" sz="1800" i="1">
+                                      <a:latin typeface="Cambria Math" panose="02040503050406030204" pitchFamily="18" charset="0"/>
+                                    </a:rPr>
+                                    <m:t>𝑎𝑖𝑟</m:t>
+                                  </m:r>
+                                </m:sub>
+                              </m:sSub>
+                            </m:e>
+                          </m:d>
+                        </m:num>
+                        <m:den>
+                          <m:r>
+                            <a:rPr lang="en-GB" sz="1800" i="1">
+                              <a:latin typeface="Cambria Math" panose="02040503050406030204" pitchFamily="18" charset="0"/>
+                            </a:rPr>
+                            <m:t>𝑃</m:t>
+                          </m:r>
+                          <m:r>
+                            <a:rPr lang="de-CH" sz="1800" i="1" baseline="-25000">
+                              <a:latin typeface="Cambria Math" panose="02040503050406030204" pitchFamily="18" charset="0"/>
+                            </a:rPr>
+                            <m:t>𝑒𝑙</m:t>
+                          </m:r>
+                        </m:den>
+                      </m:f>
+                      <m:r>
+                        <a:rPr lang="de-CH" sz="1800" i="1" smtClean="0">
+                          <a:latin typeface="Cambria Math" panose="02040503050406030204" pitchFamily="18" charset="0"/>
+                        </a:rPr>
+                        <m:t>−</m:t>
+                      </m:r>
+                      <m:sSub>
+                        <m:sSubPr>
+                          <m:ctrlPr>
+                            <a:rPr lang="en-GB" sz="1800" i="1">
+                              <a:latin typeface="Cambria Math" panose="02040503050406030204" pitchFamily="18" charset="0"/>
+                              <a:ea typeface="Cambria Math" panose="02040503050406030204" pitchFamily="18" charset="0"/>
+                            </a:rPr>
+                          </m:ctrlPr>
+                        </m:sSubPr>
+                        <m:e>
+                          <m:r>
+                            <a:rPr lang="en-GB" sz="1800" i="1">
+                              <a:latin typeface="Cambria Math" panose="02040503050406030204" pitchFamily="18" charset="0"/>
+                              <a:ea typeface="Cambria Math" panose="02040503050406030204" pitchFamily="18" charset="0"/>
+                            </a:rPr>
+                            <m:t>𝜂</m:t>
+                          </m:r>
+                        </m:e>
+                        <m:sub>
+                          <m:r>
+                            <a:rPr lang="en-GB" sz="1800" i="1">
+                              <a:latin typeface="Cambria Math" panose="02040503050406030204" pitchFamily="18" charset="0"/>
+                              <a:ea typeface="Cambria Math" panose="02040503050406030204" pitchFamily="18" charset="0"/>
+                            </a:rPr>
+                            <m:t>𝐼𝐼</m:t>
+                          </m:r>
+                        </m:sub>
+                      </m:sSub>
+                      <m:sSub>
+                        <m:sSubPr>
+                          <m:ctrlPr>
+                            <a:rPr lang="en-GB" sz="1800" i="1">
+                              <a:latin typeface="Cambria Math" panose="02040503050406030204" pitchFamily="18" charset="0"/>
+                              <a:ea typeface="Cambria Math" panose="02040503050406030204" pitchFamily="18" charset="0"/>
+                            </a:rPr>
+                          </m:ctrlPr>
+                        </m:sSubPr>
+                        <m:e>
+                          <m:r>
+                            <a:rPr lang="en-GB" sz="1800" i="1">
+                              <a:latin typeface="Cambria Math" panose="02040503050406030204" pitchFamily="18" charset="0"/>
+                              <a:ea typeface="Cambria Math" panose="02040503050406030204" pitchFamily="18" charset="0"/>
+                            </a:rPr>
+                            <m:t>𝐶𝑂𝑃</m:t>
+                          </m:r>
+                        </m:e>
+                        <m:sub>
+                          <m:r>
+                            <a:rPr lang="en-GB" sz="1800" i="1">
+                              <a:latin typeface="Cambria Math" panose="02040503050406030204" pitchFamily="18" charset="0"/>
+                              <a:ea typeface="Cambria Math" panose="02040503050406030204" pitchFamily="18" charset="0"/>
+                            </a:rPr>
+                            <m:t>𝑐𝑎𝑟𝑛𝑜𝑡</m:t>
+                          </m:r>
+                        </m:sub>
+                      </m:sSub>
+                      <m:r>
+                        <a:rPr lang="de-CH" sz="1800" b="0" i="1" smtClean="0">
+                          <a:latin typeface="Cambria Math" panose="02040503050406030204" pitchFamily="18" charset="0"/>
+                          <a:ea typeface="Cambria Math" panose="02040503050406030204" pitchFamily="18" charset="0"/>
+                        </a:rPr>
+                        <m:t>=</m:t>
+                      </m:r>
+                    </m:oMath>
+                  </m:oMathPara>
+                </a14:m>
+                <a:endParaRPr lang="de-CH" sz="1800" b="0" i="1" dirty="0">
+                  <a:latin typeface="Cambria Math" panose="02040503050406030204" pitchFamily="18" charset="0"/>
+                </a:endParaRPr>
+              </a:p>
+              <a:p>
+                <a:pPr marL="0" indent="0">
+                  <a:buNone/>
+                </a:pPr>
+                <a14:m>
+                  <m:oMathPara xmlns:m="http://schemas.openxmlformats.org/officeDocument/2006/math">
+                    <m:oMathParaPr>
+                      <m:jc m:val="centerGroup"/>
+                    </m:oMathParaPr>
+                    <m:oMath xmlns:m="http://schemas.openxmlformats.org/officeDocument/2006/math">
+                      <m:sSub>
+                        <m:sSubPr>
+                          <m:ctrlPr>
+                            <a:rPr lang="en-GB" sz="1800" i="1">
+                              <a:latin typeface="Cambria Math" panose="02040503050406030204" pitchFamily="18" charset="0"/>
+                            </a:rPr>
+                          </m:ctrlPr>
+                        </m:sSubPr>
+                        <m:e>
+                          <m:acc>
+                            <m:accPr>
+                              <m:chr m:val="̇"/>
+                              <m:ctrlPr>
+                                <a:rPr lang="en-GB" sz="1800" i="1">
+                                  <a:latin typeface="Cambria Math" panose="02040503050406030204" pitchFamily="18" charset="0"/>
+                                </a:rPr>
+                              </m:ctrlPr>
+                            </m:accPr>
+                            <m:e>
+                              <m:r>
+                                <a:rPr lang="en-GB" sz="1800" i="1">
+                                  <a:latin typeface="Cambria Math" panose="02040503050406030204" pitchFamily="18" charset="0"/>
+                                </a:rPr>
+                                <m:t>𝑄</m:t>
+                              </m:r>
+                            </m:e>
+                          </m:acc>
+                        </m:e>
+                        <m:sub>
+                          <m:r>
+                            <a:rPr lang="en-GB" sz="1800" i="1">
+                              <a:latin typeface="Cambria Math" panose="02040503050406030204" pitchFamily="18" charset="0"/>
+                            </a:rPr>
+                            <m:t>𝐾</m:t>
+                          </m:r>
+                        </m:sub>
+                      </m:sSub>
+                      <m:d>
+                        <m:dPr>
+                          <m:ctrlPr>
+                            <a:rPr lang="de-CH" sz="1800" i="1">
+                              <a:latin typeface="Cambria Math" panose="02040503050406030204" pitchFamily="18" charset="0"/>
+                            </a:rPr>
+                          </m:ctrlPr>
+                        </m:dPr>
+                        <m:e>
+                          <m:sSub>
+                            <m:sSubPr>
+                              <m:ctrlPr>
+                                <a:rPr lang="en-GB" sz="1800" i="1">
+                                  <a:latin typeface="Cambria Math" panose="02040503050406030204" pitchFamily="18" charset="0"/>
+                                </a:rPr>
+                              </m:ctrlPr>
+                            </m:sSubPr>
+                            <m:e>
+                              <m:r>
+                                <a:rPr lang="en-GB" sz="1800" i="1">
+                                  <a:latin typeface="Cambria Math" panose="02040503050406030204" pitchFamily="18" charset="0"/>
+                                </a:rPr>
+                                <m:t>𝑇</m:t>
+                              </m:r>
+                            </m:e>
+                            <m:sub>
+                              <m:r>
+                                <a:rPr lang="de-CH" sz="1800" i="1">
+                                  <a:latin typeface="Cambria Math" panose="02040503050406030204" pitchFamily="18" charset="0"/>
+                                </a:rPr>
+                                <m:t>𝑎𝑖𝑟</m:t>
+                              </m:r>
+                            </m:sub>
+                          </m:sSub>
+                        </m:e>
+                      </m:d>
+                      <m:r>
+                        <a:rPr lang="de-CH" sz="1800" i="1">
+                          <a:latin typeface="Cambria Math" panose="02040503050406030204" pitchFamily="18" charset="0"/>
+                        </a:rPr>
+                        <m:t>/</m:t>
+                      </m:r>
+                      <m:r>
+                        <a:rPr lang="en-GB" sz="1800" i="1">
+                          <a:latin typeface="Cambria Math" panose="02040503050406030204" pitchFamily="18" charset="0"/>
+                        </a:rPr>
+                        <m:t>𝑃</m:t>
+                      </m:r>
+                      <m:r>
+                        <a:rPr lang="de-CH" sz="1800" i="1" baseline="-25000">
+                          <a:latin typeface="Cambria Math" panose="02040503050406030204" pitchFamily="18" charset="0"/>
+                        </a:rPr>
+                        <m:t>𝑒𝑙</m:t>
+                      </m:r>
+                      <m:r>
+                        <a:rPr lang="de-CH" sz="1800" i="1" smtClean="0">
+                          <a:latin typeface="Cambria Math" panose="02040503050406030204" pitchFamily="18" charset="0"/>
+                        </a:rPr>
+                        <m:t>−</m:t>
+                      </m:r>
+                      <m:r>
+                        <a:rPr lang="de-CH" sz="1800" i="1" smtClean="0">
+                          <a:latin typeface="Cambria Math" panose="02040503050406030204" pitchFamily="18" charset="0"/>
+                          <a:ea typeface="Cambria Math" panose="02040503050406030204" pitchFamily="18" charset="0"/>
+                        </a:rPr>
+                        <m:t>0</m:t>
+                      </m:r>
+                      <m:r>
+                        <a:rPr lang="de-CH" sz="1800" i="1" smtClean="0">
+                          <a:latin typeface="Cambria Math" panose="02040503050406030204" pitchFamily="18" charset="0"/>
+                          <a:ea typeface="Cambria Math" panose="02040503050406030204" pitchFamily="18" charset="0"/>
+                        </a:rPr>
+                        <m:t>.</m:t>
+                      </m:r>
+                      <m:r>
+                        <a:rPr lang="de-CH" sz="1800" i="1" smtClean="0">
+                          <a:latin typeface="Cambria Math" panose="02040503050406030204" pitchFamily="18" charset="0"/>
+                          <a:ea typeface="Cambria Math" panose="02040503050406030204" pitchFamily="18" charset="0"/>
+                        </a:rPr>
+                        <m:t>4</m:t>
+                      </m:r>
+                      <m:r>
+                        <a:rPr lang="de-CH" sz="1800" i="1" smtClean="0">
+                          <a:latin typeface="Cambria Math" panose="02040503050406030204" pitchFamily="18" charset="0"/>
+                          <a:ea typeface="Cambria Math" panose="02040503050406030204" pitchFamily="18" charset="0"/>
+                        </a:rPr>
+                        <m:t>∗</m:t>
+                      </m:r>
+                      <m:f>
+                        <m:fPr>
+                          <m:ctrlPr>
+                            <a:rPr lang="en-GB" sz="1800" i="1">
+                              <a:latin typeface="Cambria Math" panose="02040503050406030204" pitchFamily="18" charset="0"/>
+                            </a:rPr>
+                          </m:ctrlPr>
+                        </m:fPr>
+                        <m:num>
+                          <m:sSub>
+                            <m:sSubPr>
+                              <m:ctrlPr>
+                                <a:rPr lang="en-GB" sz="1800" i="1">
+                                  <a:latin typeface="Cambria Math" panose="02040503050406030204" pitchFamily="18" charset="0"/>
+                                </a:rPr>
+                              </m:ctrlPr>
+                            </m:sSubPr>
+                            <m:e>
+                              <m:r>
+                                <a:rPr lang="en-GB" sz="1800" i="1">
+                                  <a:latin typeface="Cambria Math" panose="02040503050406030204" pitchFamily="18" charset="0"/>
+                                </a:rPr>
+                                <m:t>𝑇</m:t>
+                              </m:r>
+                            </m:e>
+                            <m:sub>
+                              <m:r>
+                                <a:rPr lang="de-CH" sz="1800" i="1">
+                                  <a:latin typeface="Cambria Math" panose="02040503050406030204" pitchFamily="18" charset="0"/>
+                                </a:rPr>
+                                <m:t>𝐾</m:t>
+                              </m:r>
+                            </m:sub>
+                          </m:sSub>
+                        </m:num>
+                        <m:den>
+                          <m:sSub>
+                            <m:sSubPr>
+                              <m:ctrlPr>
+                                <a:rPr lang="en-GB" sz="1800" i="1">
+                                  <a:latin typeface="Cambria Math" panose="02040503050406030204" pitchFamily="18" charset="0"/>
+                                </a:rPr>
+                              </m:ctrlPr>
+                            </m:sSubPr>
+                            <m:e>
+                              <m:r>
+                                <a:rPr lang="en-GB" sz="1800" i="1">
+                                  <a:latin typeface="Cambria Math" panose="02040503050406030204" pitchFamily="18" charset="0"/>
+                                </a:rPr>
+                                <m:t>𝑇</m:t>
+                              </m:r>
+                            </m:e>
+                            <m:sub>
+                              <m:r>
+                                <a:rPr lang="en-GB" sz="1800" i="1">
+                                  <a:latin typeface="Cambria Math" panose="02040503050406030204" pitchFamily="18" charset="0"/>
+                                </a:rPr>
+                                <m:t>𝐾</m:t>
+                              </m:r>
+                            </m:sub>
+                          </m:sSub>
+                          <m:r>
+                            <a:rPr lang="de-CH" sz="1800" i="1">
+                              <a:latin typeface="Cambria Math" panose="02040503050406030204" pitchFamily="18" charset="0"/>
+                            </a:rPr>
+                            <m:t>−</m:t>
+                          </m:r>
+                          <m:sSub>
+                            <m:sSubPr>
+                              <m:ctrlPr>
+                                <a:rPr lang="en-GB" sz="1800" i="1">
+                                  <a:latin typeface="Cambria Math" panose="02040503050406030204" pitchFamily="18" charset="0"/>
+                                </a:rPr>
+                              </m:ctrlPr>
+                            </m:sSubPr>
+                            <m:e>
+                              <m:r>
+                                <a:rPr lang="en-GB" sz="1800" i="1">
+                                  <a:latin typeface="Cambria Math" panose="02040503050406030204" pitchFamily="18" charset="0"/>
+                                </a:rPr>
+                                <m:t>𝑇</m:t>
+                              </m:r>
+                            </m:e>
+                            <m:sub>
+                              <m:r>
+                                <a:rPr lang="en-GB" sz="1800" i="1">
+                                  <a:latin typeface="Cambria Math" panose="02040503050406030204" pitchFamily="18" charset="0"/>
+                                </a:rPr>
+                                <m:t>𝑉</m:t>
+                              </m:r>
+                            </m:sub>
+                          </m:sSub>
+                        </m:den>
+                      </m:f>
+                    </m:oMath>
+                  </m:oMathPara>
+                </a14:m>
+                <a:endParaRPr lang="en-GB" sz="1800" dirty="0"/>
+              </a:p>
+              <a:p>
+                <a:pPr marL="0" indent="0">
+                  <a:buNone/>
+                </a:pPr>
+                <a:endParaRPr lang="en-GB" sz="1800" dirty="0"/>
+              </a:p>
+              <a:p>
+                <a:pPr marL="0" indent="0">
+                  <a:buNone/>
+                </a:pPr>
+                <a14:m>
+                  <m:oMathPara xmlns:m="http://schemas.openxmlformats.org/officeDocument/2006/math">
+                    <m:oMathParaPr>
+                      <m:jc m:val="centerGroup"/>
+                    </m:oMathParaPr>
+                    <m:oMath xmlns:m="http://schemas.openxmlformats.org/officeDocument/2006/math">
+                      <m:r>
+                        <a:rPr lang="de-CH" sz="1800" i="1" smtClean="0">
+                          <a:latin typeface="Cambria Math" panose="02040503050406030204" pitchFamily="18" charset="0"/>
+                        </a:rPr>
+                        <m:t>𝛿</m:t>
+                      </m:r>
+                      <m:r>
+                        <a:rPr lang="de-CH" sz="1800" i="1" smtClean="0">
+                          <a:latin typeface="Cambria Math" panose="02040503050406030204" pitchFamily="18" charset="0"/>
+                        </a:rPr>
+                        <m:t>𝐶𝑂𝑃</m:t>
+                      </m:r>
+                      <m:d>
+                        <m:dPr>
+                          <m:ctrlPr>
+                            <a:rPr lang="de-CH" sz="1800" i="1">
+                              <a:latin typeface="Cambria Math" panose="02040503050406030204" pitchFamily="18" charset="0"/>
+                            </a:rPr>
+                          </m:ctrlPr>
+                        </m:dPr>
+                        <m:e>
+                          <m:sSub>
+                            <m:sSubPr>
+                              <m:ctrlPr>
+                                <a:rPr lang="en-GB" sz="1800" i="1">
+                                  <a:latin typeface="Cambria Math" panose="02040503050406030204" pitchFamily="18" charset="0"/>
+                                </a:rPr>
+                              </m:ctrlPr>
+                            </m:sSubPr>
+                            <m:e>
+                              <m:r>
+                                <a:rPr lang="en-GB" sz="1800" i="1">
+                                  <a:latin typeface="Cambria Math" panose="02040503050406030204" pitchFamily="18" charset="0"/>
+                                </a:rPr>
+                                <m:t>𝑇</m:t>
+                              </m:r>
+                            </m:e>
+                            <m:sub>
+                              <m:r>
+                                <a:rPr lang="de-CH" sz="1800" i="1">
+                                  <a:latin typeface="Cambria Math" panose="02040503050406030204" pitchFamily="18" charset="0"/>
+                                </a:rPr>
+                                <m:t>𝑎𝑖𝑟</m:t>
+                              </m:r>
+                            </m:sub>
+                          </m:sSub>
+                        </m:e>
+                      </m:d>
+                      <m:r>
+                        <a:rPr lang="de-CH" sz="1800" b="0" i="1" smtClean="0">
+                          <a:latin typeface="Cambria Math" panose="02040503050406030204" pitchFamily="18" charset="0"/>
+                        </a:rPr>
+                        <m:t>=</m:t>
+                      </m:r>
+                      <m:r>
+                        <a:rPr lang="de-CH" sz="1800" b="0" i="1" smtClean="0">
+                          <a:latin typeface="Cambria Math" panose="02040503050406030204" pitchFamily="18" charset="0"/>
+                        </a:rPr>
+                        <m:t>𝐴</m:t>
+                      </m:r>
+                      <m:r>
+                        <a:rPr lang="de-CH" sz="1800" b="0" i="1" smtClean="0">
+                          <a:latin typeface="Cambria Math" panose="02040503050406030204" pitchFamily="18" charset="0"/>
+                        </a:rPr>
+                        <m:t>.</m:t>
+                      </m:r>
+                      <m:sSub>
+                        <m:sSubPr>
+                          <m:ctrlPr>
+                            <a:rPr lang="en-GB" sz="1800" i="1">
+                              <a:latin typeface="Cambria Math" panose="02040503050406030204" pitchFamily="18" charset="0"/>
+                            </a:rPr>
+                          </m:ctrlPr>
+                        </m:sSubPr>
+                        <m:e>
+                          <m:r>
+                            <a:rPr lang="en-GB" sz="1800" i="1">
+                              <a:latin typeface="Cambria Math" panose="02040503050406030204" pitchFamily="18" charset="0"/>
+                            </a:rPr>
+                            <m:t>𝑇</m:t>
+                          </m:r>
+                        </m:e>
+                        <m:sub>
+                          <m:r>
+                            <a:rPr lang="de-CH" sz="1800" i="1">
+                              <a:latin typeface="Cambria Math" panose="02040503050406030204" pitchFamily="18" charset="0"/>
+                            </a:rPr>
+                            <m:t>𝑎𝑖𝑟</m:t>
+                          </m:r>
+                        </m:sub>
+                      </m:sSub>
+                      <m:r>
+                        <a:rPr lang="de-CH" sz="1800" b="0" i="1" smtClean="0">
+                          <a:latin typeface="Cambria Math" panose="02040503050406030204" pitchFamily="18" charset="0"/>
+                        </a:rPr>
+                        <m:t>+</m:t>
+                      </m:r>
+                      <m:r>
+                        <a:rPr lang="de-CH" sz="1800" b="0" i="1" smtClean="0">
+                          <a:latin typeface="Cambria Math" panose="02040503050406030204" pitchFamily="18" charset="0"/>
+                        </a:rPr>
+                        <m:t>𝑏</m:t>
+                      </m:r>
+                    </m:oMath>
+                  </m:oMathPara>
+                </a14:m>
+                <a:endParaRPr lang="en-GB" sz="1800" dirty="0"/>
+              </a:p>
+              <a:p>
+                <a:pPr marL="0" indent="0">
+                  <a:buNone/>
+                </a:pPr>
+                <a:endParaRPr lang="en-GB" sz="1800" dirty="0"/>
+              </a:p>
+              <a:p>
+                <a:pPr marL="0" indent="0">
+                  <a:buNone/>
+                </a:pPr>
+                <a14:m>
+                  <m:oMathPara xmlns:m="http://schemas.openxmlformats.org/officeDocument/2006/math">
+                    <m:oMathParaPr>
+                      <m:jc m:val="centerGroup"/>
+                    </m:oMathParaPr>
+                    <m:oMath xmlns:m="http://schemas.openxmlformats.org/officeDocument/2006/math">
+                      <m:r>
+                        <a:rPr lang="de-CH" sz="1800" b="0" i="1" smtClean="0">
+                          <a:latin typeface="Cambria Math" panose="02040503050406030204" pitchFamily="18" charset="0"/>
+                        </a:rPr>
+                        <m:t>𝐶𝑂𝑃</m:t>
+                      </m:r>
+                      <m:d>
+                        <m:dPr>
+                          <m:ctrlPr>
+                            <a:rPr lang="de-CH" sz="1800" i="1">
+                              <a:latin typeface="Cambria Math" panose="02040503050406030204" pitchFamily="18" charset="0"/>
+                            </a:rPr>
+                          </m:ctrlPr>
+                        </m:dPr>
+                        <m:e>
+                          <m:sSub>
+                            <m:sSubPr>
+                              <m:ctrlPr>
+                                <a:rPr lang="en-GB" sz="1800" i="1">
+                                  <a:latin typeface="Cambria Math" panose="02040503050406030204" pitchFamily="18" charset="0"/>
+                                </a:rPr>
+                              </m:ctrlPr>
+                            </m:sSubPr>
+                            <m:e>
+                              <m:r>
+                                <a:rPr lang="en-GB" sz="1800" i="1">
+                                  <a:latin typeface="Cambria Math" panose="02040503050406030204" pitchFamily="18" charset="0"/>
+                                </a:rPr>
+                                <m:t>𝑇</m:t>
+                              </m:r>
+                            </m:e>
+                            <m:sub>
+                              <m:r>
+                                <a:rPr lang="de-CH" sz="1800" i="1">
+                                  <a:latin typeface="Cambria Math" panose="02040503050406030204" pitchFamily="18" charset="0"/>
+                                </a:rPr>
+                                <m:t>𝑎𝑖𝑟</m:t>
+                              </m:r>
+                            </m:sub>
+                          </m:sSub>
+                        </m:e>
+                      </m:d>
+                      <m:r>
+                        <a:rPr lang="de-CH" sz="1800" b="0" i="1" smtClean="0">
+                          <a:latin typeface="Cambria Math" panose="02040503050406030204" pitchFamily="18" charset="0"/>
+                        </a:rPr>
+                        <m:t>=</m:t>
+                      </m:r>
+                      <m:sSub>
+                        <m:sSubPr>
+                          <m:ctrlPr>
+                            <a:rPr lang="en-GB" sz="1800" i="1">
+                              <a:latin typeface="Cambria Math" panose="02040503050406030204" pitchFamily="18" charset="0"/>
+                            </a:rPr>
+                          </m:ctrlPr>
+                        </m:sSubPr>
+                        <m:e>
+                          <m:r>
+                            <a:rPr lang="en-GB" sz="1800" i="1">
+                              <a:latin typeface="Cambria Math" panose="02040503050406030204" pitchFamily="18" charset="0"/>
+                            </a:rPr>
+                            <m:t>𝐶𝑂𝑃</m:t>
+                          </m:r>
+                        </m:e>
+                        <m:sub>
+                          <m:r>
+                            <a:rPr lang="en-GB" sz="1800" i="1">
+                              <a:latin typeface="Cambria Math" panose="02040503050406030204" pitchFamily="18" charset="0"/>
+                            </a:rPr>
+                            <m:t>𝑟𝑒𝑎𝑙</m:t>
+                          </m:r>
+                        </m:sub>
+                      </m:sSub>
+                      <m:r>
+                        <a:rPr lang="de-CH" sz="1800" i="1">
+                          <a:latin typeface="Cambria Math" panose="02040503050406030204" pitchFamily="18" charset="0"/>
+                        </a:rPr>
+                        <m:t>+</m:t>
+                      </m:r>
+                      <m:r>
+                        <a:rPr lang="de-CH" sz="1800" i="1">
+                          <a:latin typeface="Cambria Math" panose="02040503050406030204" pitchFamily="18" charset="0"/>
+                        </a:rPr>
+                        <m:t>𝛿</m:t>
+                      </m:r>
+                      <m:r>
+                        <a:rPr lang="de-CH" sz="1800" i="1">
+                          <a:latin typeface="Cambria Math" panose="02040503050406030204" pitchFamily="18" charset="0"/>
+                        </a:rPr>
+                        <m:t>𝐶𝑂𝑃</m:t>
+                      </m:r>
+                      <m:d>
+                        <m:dPr>
+                          <m:ctrlPr>
+                            <a:rPr lang="de-CH" sz="1800" i="1">
+                              <a:latin typeface="Cambria Math" panose="02040503050406030204" pitchFamily="18" charset="0"/>
+                            </a:rPr>
+                          </m:ctrlPr>
+                        </m:dPr>
+                        <m:e>
+                          <m:sSub>
+                            <m:sSubPr>
+                              <m:ctrlPr>
+                                <a:rPr lang="en-GB" sz="1800" i="1">
+                                  <a:latin typeface="Cambria Math" panose="02040503050406030204" pitchFamily="18" charset="0"/>
+                                </a:rPr>
+                              </m:ctrlPr>
+                            </m:sSubPr>
+                            <m:e>
+                              <m:r>
+                                <a:rPr lang="en-GB" sz="1800" i="1">
+                                  <a:latin typeface="Cambria Math" panose="02040503050406030204" pitchFamily="18" charset="0"/>
+                                </a:rPr>
+                                <m:t>𝑇</m:t>
+                              </m:r>
+                            </m:e>
+                            <m:sub>
+                              <m:r>
+                                <a:rPr lang="de-CH" sz="1800" i="1">
+                                  <a:latin typeface="Cambria Math" panose="02040503050406030204" pitchFamily="18" charset="0"/>
+                                </a:rPr>
+                                <m:t>𝑎𝑖𝑟</m:t>
+                              </m:r>
+                            </m:sub>
+                          </m:sSub>
+                        </m:e>
+                      </m:d>
+                    </m:oMath>
+                  </m:oMathPara>
+                </a14:m>
+                <a:endParaRPr lang="en-GB" sz="1800" dirty="0"/>
+              </a:p>
+            </p:txBody>
+          </p:sp>
+        </mc:Choice>
+        <mc:Fallback>
+          <p:sp>
+            <p:nvSpPr>
+              <p:cNvPr id="5" name="Content Placeholder 4">
+                <a:extLst>
+                  <a:ext uri="{FF2B5EF4-FFF2-40B4-BE49-F238E27FC236}">
+                    <a16:creationId xmlns:a16="http://schemas.microsoft.com/office/drawing/2014/main" id="{4CDF34A6-A22D-A0F1-57D2-BD80A4E506A0}"/>
+                  </a:ext>
+                </a:extLst>
+              </p:cNvPr>
+              <p:cNvSpPr>
+                <a:spLocks noGrp="1" noRot="1" noChangeAspect="1" noMove="1" noResize="1" noEditPoints="1" noAdjustHandles="1" noChangeArrowheads="1" noChangeShapeType="1" noTextEdit="1"/>
+              </p:cNvSpPr>
+              <p:nvPr>
+                <p:ph sz="half" idx="1"/>
+              </p:nvPr>
+            </p:nvSpPr>
+            <p:spPr>
+              <a:blipFill>
+                <a:blip r:embed="rId2"/>
+                <a:stretch>
+                  <a:fillRect l="-824" t="-1261"/>
+                </a:stretch>
+              </a:blipFill>
+            </p:spPr>
+            <p:txBody>
+              <a:bodyPr/>
+              <a:lstStyle/>
+              <a:p>
+                <a:r>
+                  <a:rPr lang="en-US">
+                    <a:noFill/>
+                  </a:rPr>
+                  <a:t> </a:t>
+                </a:r>
+              </a:p>
+            </p:txBody>
+          </p:sp>
+        </mc:Fallback>
+      </mc:AlternateContent>
       <p:sp>
         <p:nvSpPr>
-          <p:cNvPr id="5" name="Content Placeholder 4">
-            <a:extLst>
-              <a:ext uri="{FF2B5EF4-FFF2-40B4-BE49-F238E27FC236}">
-                <a16:creationId xmlns:a16="http://schemas.microsoft.com/office/drawing/2014/main" id="{4CDF34A6-A22D-A0F1-57D2-BD80A4E506A0}"/>
-              </a:ext>
-            </a:extLst>
-          </p:cNvPr>
-          <p:cNvSpPr>
-            <a:spLocks noGrp="1"/>
+          <p:cNvPr id="6" name="Content Placeholder 4">
+            <a:extLst>
+              <a:ext uri="{FF2B5EF4-FFF2-40B4-BE49-F238E27FC236}">
+                <a16:creationId xmlns:a16="http://schemas.microsoft.com/office/drawing/2014/main" id="{85A86AC5-A19F-1787-1153-C8640D9990BF}"/>
+              </a:ext>
+            </a:extLst>
+          </p:cNvPr>
+          <p:cNvSpPr txBox="1">
+            <a:spLocks/>
           </p:cNvSpPr>
-          <p:nvPr>
-            <p:ph sz="half" idx="1"/>
-          </p:nvPr>
+          <p:nvPr/>
         </p:nvSpPr>
-        <p:spPr/>
+        <p:spPr>
+          <a:xfrm>
+            <a:off x="5640754" y="1825625"/>
+            <a:ext cx="5181600" cy="4351338"/>
+          </a:xfrm>
+          <a:prstGeom prst="rect">
+            <a:avLst/>
+          </a:prstGeom>
+        </p:spPr>
         <p:txBody>
-          <a:bodyPr/>
-          <a:lstStyle/>
-          <a:p>
-            <a:r>
-              <a:rPr lang="en-GB" sz="1800" dirty="0"/>
-              <a:t>Governing equations:</a:t>
-            </a:r>
-          </a:p>
-          <a:p>
-            <a:endParaRPr lang="en-GB" dirty="0"/>
-          </a:p>
-          <a:p>
-            <a:endParaRPr lang="en-GB" dirty="0"/>
-          </a:p>
-          <a:p>
-            <a:endParaRPr lang="en-GB" dirty="0"/>
-          </a:p>
-          <a:p>
-            <a:endParaRPr lang="en-GB" dirty="0"/>
-          </a:p>
-          <a:p>
-            <a:endParaRPr lang="en-GB" dirty="0"/>
-          </a:p>
-          <a:p>
-            <a:r>
-              <a:rPr lang="en-GB" sz="1800" dirty="0"/>
-              <a:t>Important assumptions:</a:t>
-            </a:r>
-            <a:endParaRPr lang="en-CH" sz="1800" dirty="0"/>
+          <a:bodyPr vert="horz" lIns="91440" tIns="45720" rIns="91440" bIns="45720" rtlCol="0">
+            <a:normAutofit/>
+          </a:bodyPr>
+          <a:lstStyle>
+            <a:lvl1pPr marL="228600" indent="-228600" algn="l" defTabSz="914400" rtl="0" eaLnBrk="1" latinLnBrk="0" hangingPunct="1">
+              <a:lnSpc>
+                <a:spcPct val="90000"/>
+              </a:lnSpc>
+              <a:spcBef>
+                <a:spcPts val="1000"/>
+              </a:spcBef>
+              <a:buFont typeface="Arial" panose="020B0604020202020204" pitchFamily="34" charset="0"/>
+              <a:buChar char="•"/>
+              <a:defRPr sz="2800" kern="1200">
+                <a:solidFill>
+                  <a:schemeClr val="tx1"/>
+                </a:solidFill>
+                <a:latin typeface="+mn-lt"/>
+                <a:ea typeface="+mn-ea"/>
+                <a:cs typeface="+mn-cs"/>
+              </a:defRPr>
+            </a:lvl1pPr>
+            <a:lvl2pPr marL="685800" indent="-228600" algn="l" defTabSz="914400" rtl="0" eaLnBrk="1" latinLnBrk="0" hangingPunct="1">
+              <a:lnSpc>
+                <a:spcPct val="90000"/>
+              </a:lnSpc>
+              <a:spcBef>
+                <a:spcPts val="500"/>
+              </a:spcBef>
+              <a:buFont typeface="Arial" panose="020B0604020202020204" pitchFamily="34" charset="0"/>
+              <a:buChar char="•"/>
+              <a:defRPr sz="2400" kern="1200">
+                <a:solidFill>
+                  <a:schemeClr val="tx1"/>
+                </a:solidFill>
+                <a:latin typeface="+mn-lt"/>
+                <a:ea typeface="+mn-ea"/>
+                <a:cs typeface="+mn-cs"/>
+              </a:defRPr>
+            </a:lvl2pPr>
+            <a:lvl3pPr marL="1143000" indent="-228600" algn="l" defTabSz="914400" rtl="0" eaLnBrk="1" latinLnBrk="0" hangingPunct="1">
+              <a:lnSpc>
+                <a:spcPct val="90000"/>
+              </a:lnSpc>
+              <a:spcBef>
+                <a:spcPts val="500"/>
+              </a:spcBef>
+              <a:buFont typeface="Arial" panose="020B0604020202020204" pitchFamily="34" charset="0"/>
+              <a:buChar char="•"/>
+              <a:defRPr sz="2000" kern="1200">
+                <a:solidFill>
+                  <a:schemeClr val="tx1"/>
+                </a:solidFill>
+                <a:latin typeface="+mn-lt"/>
+                <a:ea typeface="+mn-ea"/>
+                <a:cs typeface="+mn-cs"/>
+              </a:defRPr>
+            </a:lvl3pPr>
+            <a:lvl4pPr marL="1600200" indent="-228600" algn="l" defTabSz="914400" rtl="0" eaLnBrk="1" latinLnBrk="0" hangingPunct="1">
+              <a:lnSpc>
+                <a:spcPct val="90000"/>
+              </a:lnSpc>
+              <a:spcBef>
+                <a:spcPts val="500"/>
+              </a:spcBef>
+              <a:buFont typeface="Arial" panose="020B0604020202020204" pitchFamily="34" charset="0"/>
+              <a:buChar char="•"/>
+              <a:defRPr sz="1800" kern="1200">
+                <a:solidFill>
+                  <a:schemeClr val="tx1"/>
+                </a:solidFill>
+                <a:latin typeface="+mn-lt"/>
+                <a:ea typeface="+mn-ea"/>
+                <a:cs typeface="+mn-cs"/>
+              </a:defRPr>
+            </a:lvl4pPr>
+            <a:lvl5pPr marL="2057400" indent="-228600" algn="l" defTabSz="914400" rtl="0" eaLnBrk="1" latinLnBrk="0" hangingPunct="1">
+              <a:lnSpc>
+                <a:spcPct val="90000"/>
+              </a:lnSpc>
+              <a:spcBef>
+                <a:spcPts val="500"/>
+              </a:spcBef>
+              <a:buFont typeface="Arial" panose="020B0604020202020204" pitchFamily="34" charset="0"/>
+              <a:buChar char="•"/>
+              <a:defRPr sz="1800" kern="1200">
+                <a:solidFill>
+                  <a:schemeClr val="tx1"/>
+                </a:solidFill>
+                <a:latin typeface="+mn-lt"/>
+                <a:ea typeface="+mn-ea"/>
+                <a:cs typeface="+mn-cs"/>
+              </a:defRPr>
+            </a:lvl5pPr>
+            <a:lvl6pPr marL="2514600" indent="-228600" algn="l" defTabSz="914400" rtl="0" eaLnBrk="1" latinLnBrk="0" hangingPunct="1">
+              <a:lnSpc>
+                <a:spcPct val="90000"/>
+              </a:lnSpc>
+              <a:spcBef>
+                <a:spcPts val="500"/>
+              </a:spcBef>
+              <a:buFont typeface="Arial" panose="020B0604020202020204" pitchFamily="34" charset="0"/>
+              <a:buChar char="•"/>
+              <a:defRPr sz="1800" kern="1200">
+                <a:solidFill>
+                  <a:schemeClr val="tx1"/>
+                </a:solidFill>
+                <a:latin typeface="+mn-lt"/>
+                <a:ea typeface="+mn-ea"/>
+                <a:cs typeface="+mn-cs"/>
+              </a:defRPr>
+            </a:lvl6pPr>
+            <a:lvl7pPr marL="2971800" indent="-228600" algn="l" defTabSz="914400" rtl="0" eaLnBrk="1" latinLnBrk="0" hangingPunct="1">
+              <a:lnSpc>
+                <a:spcPct val="90000"/>
+              </a:lnSpc>
+              <a:spcBef>
+                <a:spcPts val="500"/>
+              </a:spcBef>
+              <a:buFont typeface="Arial" panose="020B0604020202020204" pitchFamily="34" charset="0"/>
+              <a:buChar char="•"/>
+              <a:defRPr sz="1800" kern="1200">
+                <a:solidFill>
+                  <a:schemeClr val="tx1"/>
+                </a:solidFill>
+                <a:latin typeface="+mn-lt"/>
+                <a:ea typeface="+mn-ea"/>
+                <a:cs typeface="+mn-cs"/>
+              </a:defRPr>
+            </a:lvl7pPr>
+            <a:lvl8pPr marL="3429000" indent="-228600" algn="l" defTabSz="914400" rtl="0" eaLnBrk="1" latinLnBrk="0" hangingPunct="1">
+              <a:lnSpc>
+                <a:spcPct val="90000"/>
+              </a:lnSpc>
+              <a:spcBef>
+                <a:spcPts val="500"/>
+              </a:spcBef>
+              <a:buFont typeface="Arial" panose="020B0604020202020204" pitchFamily="34" charset="0"/>
+              <a:buChar char="•"/>
+              <a:defRPr sz="1800" kern="1200">
+                <a:solidFill>
+                  <a:schemeClr val="tx1"/>
+                </a:solidFill>
+                <a:latin typeface="+mn-lt"/>
+                <a:ea typeface="+mn-ea"/>
+                <a:cs typeface="+mn-cs"/>
+              </a:defRPr>
+            </a:lvl8pPr>
+            <a:lvl9pPr marL="3886200" indent="-228600" algn="l" defTabSz="914400" rtl="0" eaLnBrk="1" latinLnBrk="0" hangingPunct="1">
+              <a:lnSpc>
+                <a:spcPct val="90000"/>
+              </a:lnSpc>
+              <a:spcBef>
+                <a:spcPts val="500"/>
+              </a:spcBef>
+              <a:buFont typeface="Arial" panose="020B0604020202020204" pitchFamily="34" charset="0"/>
+              <a:buChar char="•"/>
+              <a:defRPr sz="1800" kern="1200">
+                <a:solidFill>
+                  <a:schemeClr val="tx1"/>
+                </a:solidFill>
+                <a:latin typeface="+mn-lt"/>
+                <a:ea typeface="+mn-ea"/>
+                <a:cs typeface="+mn-cs"/>
+              </a:defRPr>
+            </a:lvl9pPr>
+          </a:lstStyle>
+          <a:p>
+            <a:r>
+              <a:rPr lang="de-CH" sz="1800" dirty="0"/>
+              <a:t>Plain </a:t>
+            </a:r>
+            <a:r>
+              <a:rPr lang="de-CH" sz="1800" dirty="0" err="1"/>
+              <a:t>english</a:t>
+            </a:r>
+            <a:r>
+              <a:rPr lang="de-CH" sz="1800" dirty="0"/>
+              <a:t>:</a:t>
+            </a:r>
+          </a:p>
+          <a:p>
+            <a:endParaRPr lang="de-CH" sz="1800" dirty="0"/>
+          </a:p>
+          <a:p>
+            <a:r>
+              <a:rPr lang="de-CH" sz="1800" dirty="0" err="1"/>
+              <a:t>Condenser</a:t>
+            </a:r>
+            <a:r>
+              <a:rPr lang="de-CH" sz="1800" dirty="0"/>
+              <a:t> </a:t>
+            </a:r>
+            <a:r>
+              <a:rPr lang="de-CH" sz="1800" dirty="0" err="1"/>
+              <a:t>duty</a:t>
+            </a:r>
+            <a:r>
+              <a:rPr lang="de-CH" sz="1800" dirty="0"/>
+              <a:t> </a:t>
+            </a:r>
+            <a:r>
+              <a:rPr lang="de-CH" sz="1800" dirty="0" err="1"/>
+              <a:t>is</a:t>
+            </a:r>
+            <a:r>
+              <a:rPr lang="de-CH" sz="1800" dirty="0"/>
+              <a:t> a </a:t>
+            </a:r>
+            <a:r>
+              <a:rPr lang="de-CH" sz="1800" dirty="0" err="1"/>
+              <a:t>function</a:t>
+            </a:r>
+            <a:r>
+              <a:rPr lang="de-CH" sz="1800" dirty="0"/>
+              <a:t> </a:t>
+            </a:r>
+            <a:r>
+              <a:rPr lang="de-CH" sz="1800" dirty="0" err="1"/>
+              <a:t>of</a:t>
+            </a:r>
+            <a:r>
+              <a:rPr lang="de-CH" sz="1800" dirty="0"/>
+              <a:t> </a:t>
+            </a:r>
+            <a:r>
+              <a:rPr lang="de-CH" sz="1800" dirty="0" err="1"/>
+              <a:t>air</a:t>
+            </a:r>
+            <a:r>
+              <a:rPr lang="de-CH" sz="1800" dirty="0"/>
+              <a:t> </a:t>
+            </a:r>
+            <a:r>
+              <a:rPr lang="de-CH" sz="1800" dirty="0" err="1"/>
+              <a:t>inlet</a:t>
+            </a:r>
+            <a:r>
+              <a:rPr lang="de-CH" sz="1800" dirty="0"/>
+              <a:t> </a:t>
+            </a:r>
+            <a:r>
+              <a:rPr lang="de-CH" sz="1800" dirty="0" err="1"/>
+              <a:t>temp</a:t>
+            </a:r>
+            <a:r>
+              <a:rPr lang="de-CH" sz="1800" dirty="0"/>
+              <a:t>, </a:t>
+            </a:r>
+            <a:r>
+              <a:rPr lang="de-CH" sz="1800" dirty="0" err="1"/>
+              <a:t>because</a:t>
+            </a:r>
+            <a:r>
+              <a:rPr lang="de-CH" sz="1800" dirty="0"/>
+              <a:t> </a:t>
+            </a:r>
+            <a:r>
+              <a:rPr lang="de-CH" sz="1800" dirty="0" err="1"/>
+              <a:t>the</a:t>
+            </a:r>
+            <a:r>
+              <a:rPr lang="de-CH" sz="1800" dirty="0"/>
+              <a:t> COP </a:t>
+            </a:r>
+            <a:r>
+              <a:rPr lang="de-CH" sz="1800" dirty="0" err="1"/>
+              <a:t>is</a:t>
+            </a:r>
+            <a:r>
+              <a:rPr lang="de-CH" sz="1800" dirty="0"/>
+              <a:t> also a </a:t>
+            </a:r>
+            <a:r>
+              <a:rPr lang="de-CH" sz="1800" dirty="0" err="1"/>
+              <a:t>function</a:t>
+            </a:r>
+            <a:r>
+              <a:rPr lang="de-CH" sz="1800" dirty="0"/>
+              <a:t> </a:t>
+            </a:r>
+            <a:r>
+              <a:rPr lang="de-CH" sz="1800" dirty="0" err="1"/>
+              <a:t>of</a:t>
+            </a:r>
+            <a:r>
+              <a:rPr lang="de-CH" sz="1800" dirty="0"/>
+              <a:t> </a:t>
+            </a:r>
+            <a:r>
+              <a:rPr lang="de-CH" sz="1800" dirty="0" err="1"/>
+              <a:t>the</a:t>
+            </a:r>
+            <a:r>
+              <a:rPr lang="de-CH" sz="1800" dirty="0"/>
+              <a:t> </a:t>
+            </a:r>
+            <a:r>
+              <a:rPr lang="de-CH" sz="1800" dirty="0" err="1"/>
+              <a:t>air</a:t>
+            </a:r>
+            <a:r>
+              <a:rPr lang="de-CH" sz="1800" dirty="0"/>
+              <a:t> </a:t>
+            </a:r>
+            <a:r>
+              <a:rPr lang="de-CH" sz="1800" dirty="0" err="1"/>
+              <a:t>inlet</a:t>
+            </a:r>
+            <a:r>
+              <a:rPr lang="de-CH" sz="1800" dirty="0"/>
+              <a:t> </a:t>
+            </a:r>
+            <a:r>
+              <a:rPr lang="de-CH" sz="1800" dirty="0" err="1"/>
+              <a:t>temp</a:t>
+            </a:r>
+            <a:endParaRPr lang="de-CH" sz="1800" dirty="0"/>
+          </a:p>
+          <a:p>
+            <a:r>
+              <a:rPr lang="de-CH" sz="1800" dirty="0"/>
+              <a:t>The </a:t>
+            </a:r>
+            <a:r>
+              <a:rPr lang="de-CH" sz="1800" dirty="0" err="1"/>
+              <a:t>difference</a:t>
+            </a:r>
+            <a:r>
+              <a:rPr lang="de-CH" sz="1800" dirty="0"/>
+              <a:t> </a:t>
+            </a:r>
+            <a:r>
+              <a:rPr lang="de-CH" sz="1800" dirty="0" err="1"/>
+              <a:t>between</a:t>
+            </a:r>
+            <a:r>
+              <a:rPr lang="de-CH" sz="1800" dirty="0"/>
+              <a:t> </a:t>
+            </a:r>
+            <a:r>
+              <a:rPr lang="de-CH" sz="1800" dirty="0" err="1"/>
+              <a:t>the</a:t>
+            </a:r>
+            <a:r>
+              <a:rPr lang="de-CH" sz="1800" dirty="0"/>
+              <a:t> </a:t>
+            </a:r>
+            <a:r>
+              <a:rPr lang="de-CH" sz="1800" dirty="0" err="1"/>
+              <a:t>observed</a:t>
+            </a:r>
+            <a:r>
+              <a:rPr lang="de-CH" sz="1800" dirty="0"/>
+              <a:t> COP and </a:t>
+            </a:r>
+            <a:r>
+              <a:rPr lang="de-CH" sz="1800" dirty="0" err="1"/>
+              <a:t>the</a:t>
+            </a:r>
+            <a:r>
+              <a:rPr lang="de-CH" sz="1800" dirty="0"/>
+              <a:t> real COP (</a:t>
+            </a:r>
+            <a:r>
+              <a:rPr lang="de-CH" sz="1800" dirty="0" err="1"/>
+              <a:t>as</a:t>
+            </a:r>
+            <a:r>
+              <a:rPr lang="de-CH" sz="1800" dirty="0"/>
+              <a:t> </a:t>
+            </a:r>
+            <a:r>
+              <a:rPr lang="de-CH" sz="1800" dirty="0" err="1"/>
+              <a:t>defined</a:t>
+            </a:r>
+            <a:r>
+              <a:rPr lang="de-CH" sz="1800" dirty="0"/>
+              <a:t> </a:t>
+            </a:r>
+            <a:r>
+              <a:rPr lang="de-CH" sz="1800" dirty="0" err="1"/>
+              <a:t>by</a:t>
+            </a:r>
+            <a:r>
+              <a:rPr lang="de-CH" sz="1800" dirty="0"/>
+              <a:t> </a:t>
+            </a:r>
+            <a:r>
+              <a:rPr lang="de-CH" sz="1800" dirty="0" err="1"/>
+              <a:t>carnot</a:t>
+            </a:r>
+            <a:r>
+              <a:rPr lang="de-CH" sz="1800" dirty="0"/>
+              <a:t> COP x </a:t>
+            </a:r>
+            <a:r>
+              <a:rPr lang="de-CH" sz="1800" dirty="0" err="1"/>
+              <a:t>guetegrad</a:t>
+            </a:r>
+            <a:r>
+              <a:rPr lang="de-CH" sz="1800" dirty="0"/>
+              <a:t>) </a:t>
+            </a:r>
+            <a:r>
+              <a:rPr lang="de-CH" sz="1800" dirty="0" err="1"/>
+              <a:t>is</a:t>
+            </a:r>
+            <a:r>
+              <a:rPr lang="de-CH" sz="1800" dirty="0"/>
+              <a:t> </a:t>
+            </a:r>
+            <a:r>
+              <a:rPr lang="de-CH" sz="1800" dirty="0" err="1"/>
+              <a:t>deltaCOP</a:t>
+            </a:r>
+            <a:r>
+              <a:rPr lang="de-CH" sz="1800" dirty="0"/>
+              <a:t> </a:t>
+            </a:r>
+            <a:r>
+              <a:rPr lang="de-CH" sz="1800" dirty="0" err="1"/>
+              <a:t>which</a:t>
+            </a:r>
+            <a:r>
+              <a:rPr lang="de-CH" sz="1800" dirty="0"/>
+              <a:t> </a:t>
+            </a:r>
+            <a:r>
+              <a:rPr lang="de-CH" sz="1800" dirty="0" err="1"/>
+              <a:t>is</a:t>
+            </a:r>
+            <a:r>
+              <a:rPr lang="de-CH" sz="1800" dirty="0"/>
+              <a:t> </a:t>
+            </a:r>
+            <a:r>
+              <a:rPr lang="de-CH" sz="1800" dirty="0" err="1"/>
+              <a:t>therefore</a:t>
+            </a:r>
+            <a:r>
+              <a:rPr lang="de-CH" sz="1800" dirty="0"/>
+              <a:t> also a </a:t>
+            </a:r>
+            <a:r>
+              <a:rPr lang="de-CH" sz="1800" dirty="0" err="1"/>
+              <a:t>function</a:t>
+            </a:r>
+            <a:r>
+              <a:rPr lang="de-CH" sz="1800" dirty="0"/>
+              <a:t> </a:t>
+            </a:r>
+            <a:r>
+              <a:rPr lang="de-CH" sz="1800" dirty="0" err="1"/>
+              <a:t>of</a:t>
+            </a:r>
+            <a:r>
+              <a:rPr lang="de-CH" sz="1800" dirty="0"/>
+              <a:t> </a:t>
+            </a:r>
+            <a:r>
+              <a:rPr lang="de-CH" sz="1800" dirty="0" err="1"/>
+              <a:t>the</a:t>
+            </a:r>
+            <a:r>
+              <a:rPr lang="de-CH" sz="1800" dirty="0"/>
+              <a:t> </a:t>
+            </a:r>
+            <a:r>
+              <a:rPr lang="de-CH" sz="1800" dirty="0" err="1"/>
+              <a:t>air</a:t>
+            </a:r>
+            <a:r>
+              <a:rPr lang="de-CH" sz="1800" dirty="0"/>
+              <a:t> </a:t>
+            </a:r>
+            <a:r>
+              <a:rPr lang="de-CH" sz="1800" dirty="0" err="1"/>
+              <a:t>inlet</a:t>
+            </a:r>
+            <a:r>
+              <a:rPr lang="de-CH" sz="1800" dirty="0"/>
+              <a:t> </a:t>
+            </a:r>
+            <a:r>
+              <a:rPr lang="de-CH" sz="1800" dirty="0" err="1"/>
+              <a:t>temp</a:t>
+            </a:r>
+            <a:endParaRPr lang="de-CH" sz="1800" dirty="0"/>
+          </a:p>
+          <a:p>
+            <a:r>
+              <a:rPr lang="de-CH" sz="1800" dirty="0"/>
+              <a:t>Plot out </a:t>
+            </a:r>
+            <a:r>
+              <a:rPr lang="de-CH" sz="1800" dirty="0" err="1"/>
+              <a:t>deltaCOP</a:t>
+            </a:r>
+            <a:r>
+              <a:rPr lang="de-CH" sz="1800" dirty="0"/>
+              <a:t> </a:t>
+            </a:r>
+            <a:r>
+              <a:rPr lang="de-CH" sz="1800" dirty="0" err="1"/>
+              <a:t>across</a:t>
+            </a:r>
+            <a:r>
+              <a:rPr lang="de-CH" sz="1800" dirty="0"/>
+              <a:t> all </a:t>
+            </a:r>
+            <a:r>
+              <a:rPr lang="de-CH" sz="1800" dirty="0" err="1"/>
+              <a:t>air</a:t>
+            </a:r>
+            <a:r>
+              <a:rPr lang="de-CH" sz="1800" dirty="0"/>
+              <a:t> </a:t>
+            </a:r>
+            <a:r>
+              <a:rPr lang="de-CH" sz="1800" dirty="0" err="1"/>
+              <a:t>temps</a:t>
+            </a:r>
+            <a:r>
+              <a:rPr lang="de-CH" sz="1800" dirty="0"/>
+              <a:t> and fit a </a:t>
+            </a:r>
+            <a:r>
+              <a:rPr lang="de-CH" sz="1800" dirty="0" err="1"/>
+              <a:t>line</a:t>
+            </a:r>
+            <a:r>
+              <a:rPr lang="de-CH" sz="1800" dirty="0"/>
+              <a:t> </a:t>
+            </a:r>
+            <a:r>
+              <a:rPr lang="de-CH" sz="1800" dirty="0" err="1"/>
+              <a:t>to</a:t>
+            </a:r>
+            <a:r>
+              <a:rPr lang="de-CH" sz="1800" dirty="0"/>
+              <a:t> </a:t>
+            </a:r>
+            <a:r>
+              <a:rPr lang="de-CH" sz="1800" dirty="0" err="1"/>
+              <a:t>it</a:t>
+            </a:r>
+            <a:endParaRPr lang="de-CH" sz="1800" dirty="0"/>
+          </a:p>
+          <a:p>
+            <a:r>
+              <a:rPr lang="de-CH" sz="1800" dirty="0" err="1"/>
+              <a:t>Then</a:t>
+            </a:r>
+            <a:r>
+              <a:rPr lang="de-CH" sz="1800" dirty="0"/>
+              <a:t> </a:t>
+            </a:r>
+            <a:r>
+              <a:rPr lang="de-CH" sz="1800" dirty="0" err="1"/>
+              <a:t>we</a:t>
+            </a:r>
+            <a:r>
+              <a:rPr lang="de-CH" sz="1800" dirty="0"/>
+              <a:t> </a:t>
+            </a:r>
+            <a:r>
+              <a:rPr lang="de-CH" sz="1800" dirty="0" err="1"/>
+              <a:t>have</a:t>
+            </a:r>
+            <a:r>
+              <a:rPr lang="de-CH" sz="1800" dirty="0"/>
+              <a:t> an </a:t>
+            </a:r>
+            <a:r>
+              <a:rPr lang="de-CH" sz="1800" dirty="0" err="1"/>
+              <a:t>air</a:t>
+            </a:r>
+            <a:r>
+              <a:rPr lang="de-CH" sz="1800" dirty="0"/>
+              <a:t> </a:t>
+            </a:r>
+            <a:r>
+              <a:rPr lang="de-CH" sz="1800" dirty="0" err="1"/>
+              <a:t>temperature</a:t>
+            </a:r>
+            <a:r>
+              <a:rPr lang="de-CH" sz="1800" dirty="0"/>
+              <a:t> </a:t>
+            </a:r>
+            <a:r>
+              <a:rPr lang="de-CH" sz="1800" dirty="0" err="1"/>
+              <a:t>dependent</a:t>
+            </a:r>
+            <a:r>
+              <a:rPr lang="de-CH" sz="1800" dirty="0"/>
+              <a:t> </a:t>
+            </a:r>
+            <a:r>
+              <a:rPr lang="de-CH" sz="1800" dirty="0" err="1"/>
+              <a:t>deltaCOP</a:t>
+            </a:r>
+            <a:r>
+              <a:rPr lang="de-CH" sz="1800" dirty="0"/>
+              <a:t> </a:t>
+            </a:r>
+            <a:r>
+              <a:rPr lang="de-CH" sz="1800" dirty="0" err="1"/>
+              <a:t>to</a:t>
+            </a:r>
+            <a:r>
+              <a:rPr lang="de-CH" sz="1800" dirty="0"/>
+              <a:t> </a:t>
+            </a:r>
+            <a:r>
+              <a:rPr lang="de-CH" sz="1800" dirty="0" err="1"/>
+              <a:t>add</a:t>
+            </a:r>
+            <a:r>
+              <a:rPr lang="de-CH" sz="1800" dirty="0"/>
+              <a:t> </a:t>
+            </a:r>
+            <a:r>
+              <a:rPr lang="de-CH" sz="1800" dirty="0" err="1"/>
+              <a:t>to</a:t>
+            </a:r>
+            <a:r>
+              <a:rPr lang="de-CH" sz="1800" dirty="0"/>
+              <a:t> </a:t>
+            </a:r>
+            <a:r>
+              <a:rPr lang="de-CH" sz="1800" dirty="0" err="1"/>
+              <a:t>the</a:t>
+            </a:r>
+            <a:r>
+              <a:rPr lang="de-CH" sz="1800" dirty="0"/>
+              <a:t> real COP in </a:t>
+            </a:r>
+            <a:r>
+              <a:rPr lang="de-CH" sz="1800" dirty="0" err="1"/>
+              <a:t>order</a:t>
+            </a:r>
+            <a:r>
+              <a:rPr lang="de-CH" sz="1800" dirty="0"/>
+              <a:t> </a:t>
+            </a:r>
+            <a:r>
+              <a:rPr lang="de-CH" sz="1800" dirty="0" err="1"/>
+              <a:t>to</a:t>
+            </a:r>
+            <a:r>
+              <a:rPr lang="de-CH" sz="1800" dirty="0"/>
+              <a:t> </a:t>
+            </a:r>
+            <a:r>
+              <a:rPr lang="de-CH" sz="1800" dirty="0" err="1"/>
+              <a:t>calculate</a:t>
+            </a:r>
+            <a:r>
+              <a:rPr lang="de-CH" sz="1800" dirty="0"/>
+              <a:t> </a:t>
+            </a:r>
+            <a:r>
+              <a:rPr lang="de-CH" sz="1800" dirty="0" err="1"/>
+              <a:t>what</a:t>
+            </a:r>
+            <a:r>
+              <a:rPr lang="de-CH" sz="1800" dirty="0"/>
+              <a:t> </a:t>
+            </a:r>
+            <a:r>
+              <a:rPr lang="de-CH" sz="1800" dirty="0" err="1"/>
+              <a:t>the</a:t>
+            </a:r>
+            <a:r>
+              <a:rPr lang="de-CH" sz="1800" dirty="0"/>
+              <a:t> </a:t>
+            </a:r>
+            <a:r>
+              <a:rPr lang="de-CH" sz="1800" dirty="0" err="1"/>
+              <a:t>observed</a:t>
+            </a:r>
+            <a:r>
+              <a:rPr lang="de-CH" sz="1800" dirty="0"/>
+              <a:t> COP </a:t>
+            </a:r>
+            <a:r>
+              <a:rPr lang="de-CH" sz="1800" dirty="0" err="1"/>
+              <a:t>is</a:t>
+            </a:r>
+            <a:r>
+              <a:rPr lang="de-CH" sz="1800" dirty="0"/>
+              <a:t> </a:t>
+            </a:r>
+            <a:r>
+              <a:rPr lang="de-CH" sz="1800" dirty="0" err="1"/>
+              <a:t>going</a:t>
+            </a:r>
+            <a:r>
+              <a:rPr lang="de-CH" sz="1800" dirty="0"/>
+              <a:t> </a:t>
+            </a:r>
+            <a:r>
+              <a:rPr lang="de-CH" sz="1800" dirty="0" err="1"/>
+              <a:t>to</a:t>
+            </a:r>
+            <a:r>
+              <a:rPr lang="de-CH" sz="1800" dirty="0"/>
+              <a:t> </a:t>
+            </a:r>
+            <a:r>
+              <a:rPr lang="de-CH" sz="1800" dirty="0" err="1"/>
+              <a:t>be</a:t>
+            </a:r>
+            <a:endParaRPr lang="de-CH" sz="1800" dirty="0"/>
           </a:p>
         </p:txBody>
       </p:sp>
@@ -7301,4 +9341,340 @@
     </a:ext>
   </a:extLst>
 </a:theme>
+</file>
+
+<file path=customXml/item1.xml><?xml version="1.0" encoding="utf-8"?>
+<p:properties xmlns:p="http://schemas.microsoft.com/office/2006/metadata/properties" xmlns:xsi="http://www.w3.org/2001/XMLSchema-instance" xmlns:pc="http://schemas.microsoft.com/office/infopath/2007/PartnerControls">
+  <documentManagement>
+    <Datum xmlns="9a7d57e2-a6f6-4353-bdc3-995d0b2e54a4">2021-01-02T00:00:00Z</Datum>
+    <_Flow_SignoffStatus xmlns="9a7d57e2-a6f6-4353-bdc3-995d0b2e54a4" xsi:nil="true"/>
+    <Speaker xmlns="9a7d57e2-a6f6-4353-bdc3-995d0b2e54a4">
+      <UserInfo>
+        <DisplayName/>
+        <AccountId xsi:nil="true"/>
+        <AccountType/>
+      </UserInfo>
+    </Speaker>
+    <lcf76f155ced4ddcb4097134ff3c332f xmlns="9a7d57e2-a6f6-4353-bdc3-995d0b2e54a4">
+      <Terms xmlns="http://schemas.microsoft.com/office/infopath/2007/PartnerControls"/>
+    </lcf76f155ced4ddcb4097134ff3c332f>
+    <TaxCatchAll xmlns="bd5c1ef4-a5a8-4f60-b734-518beb01c7b7" xsi:nil="true"/>
+  </documentManagement>
+</p:properties>
+</file>
+
+<file path=customXml/item2.xml><?xml version="1.0" encoding="utf-8"?>
+<ct:contentTypeSchema xmlns:ct="http://schemas.microsoft.com/office/2006/metadata/contentType" xmlns:ma="http://schemas.microsoft.com/office/2006/metadata/properties/metaAttributes" ct:_="" ma:_="" ma:contentTypeName="Dokument" ma:contentTypeID="0x010100E756FDFCB57D0948B915F9BF5E819397" ma:contentTypeVersion="19" ma:contentTypeDescription="Ein neues Dokument erstellen." ma:contentTypeScope="" ma:versionID="7852f5f8c1d507250c2012b3a813d277">
+  <xsd:schema xmlns:xsd="http://www.w3.org/2001/XMLSchema" xmlns:xs="http://www.w3.org/2001/XMLSchema" xmlns:p="http://schemas.microsoft.com/office/2006/metadata/properties" xmlns:ns2="9a7d57e2-a6f6-4353-bdc3-995d0b2e54a4" xmlns:ns3="bd5c1ef4-a5a8-4f60-b734-518beb01c7b7" targetNamespace="http://schemas.microsoft.com/office/2006/metadata/properties" ma:root="true" ma:fieldsID="57c110224e734d506e5598409d1cd34c" ns2:_="" ns3:_="">
+    <xsd:import namespace="9a7d57e2-a6f6-4353-bdc3-995d0b2e54a4"/>
+    <xsd:import namespace="bd5c1ef4-a5a8-4f60-b734-518beb01c7b7"/>
+    <xsd:element name="properties">
+      <xsd:complexType>
+        <xsd:sequence>
+          <xsd:element name="documentManagement">
+            <xsd:complexType>
+              <xsd:all>
+                <xsd:element ref="ns2:MediaServiceMetadata" minOccurs="0"/>
+                <xsd:element ref="ns2:MediaServiceFastMetadata" minOccurs="0"/>
+                <xsd:element ref="ns2:MediaServiceOCR" minOccurs="0"/>
+                <xsd:element ref="ns2:MediaServiceGenerationTime" minOccurs="0"/>
+                <xsd:element ref="ns2:MediaServiceEventHashCode" minOccurs="0"/>
+                <xsd:element ref="ns3:SharedWithUsers" minOccurs="0"/>
+                <xsd:element ref="ns3:SharedWithDetails" minOccurs="0"/>
+                <xsd:element ref="ns2:MediaServiceDateTaken" minOccurs="0"/>
+                <xsd:element ref="ns2:MediaServiceAutoKeyPoints" minOccurs="0"/>
+                <xsd:element ref="ns2:MediaServiceKeyPoints" minOccurs="0"/>
+                <xsd:element ref="ns2:Speaker" minOccurs="0"/>
+                <xsd:element ref="ns2:Datum" minOccurs="0"/>
+                <xsd:element ref="ns2:_Flow_SignoffStatus" minOccurs="0"/>
+                <xsd:element ref="ns2:MediaLengthInSeconds" minOccurs="0"/>
+                <xsd:element ref="ns2:MediaServiceLocation" minOccurs="0"/>
+                <xsd:element ref="ns2:lcf76f155ced4ddcb4097134ff3c332f" minOccurs="0"/>
+                <xsd:element ref="ns3:TaxCatchAll" minOccurs="0"/>
+              </xsd:all>
+            </xsd:complexType>
+          </xsd:element>
+        </xsd:sequence>
+      </xsd:complexType>
+    </xsd:element>
+  </xsd:schema>
+  <xsd:schema xmlns:xsd="http://www.w3.org/2001/XMLSchema" xmlns:xs="http://www.w3.org/2001/XMLSchema" xmlns:dms="http://schemas.microsoft.com/office/2006/documentManagement/types" xmlns:pc="http://schemas.microsoft.com/office/infopath/2007/PartnerControls" targetNamespace="9a7d57e2-a6f6-4353-bdc3-995d0b2e54a4" elementFormDefault="qualified">
+    <xsd:import namespace="http://schemas.microsoft.com/office/2006/documentManagement/types"/>
+    <xsd:import namespace="http://schemas.microsoft.com/office/infopath/2007/PartnerControls"/>
+    <xsd:element name="MediaServiceMetadata" ma:index="8" nillable="true" ma:displayName="MediaServiceMetadata" ma:hidden="true" ma:internalName="MediaServiceMetadata" ma:readOnly="true">
+      <xsd:simpleType>
+        <xsd:restriction base="dms:Note"/>
+      </xsd:simpleType>
+    </xsd:element>
+    <xsd:element name="MediaServiceFastMetadata" ma:index="9" nillable="true" ma:displayName="MediaServiceFastMetadata" ma:hidden="true" ma:internalName="MediaServiceFastMetadata" ma:readOnly="true">
+      <xsd:simpleType>
+        <xsd:restriction base="dms:Note"/>
+      </xsd:simpleType>
+    </xsd:element>
+    <xsd:element name="MediaServiceOCR" ma:index="10" nillable="true" ma:displayName="Extracted Text" ma:internalName="MediaServiceOCR" ma:readOnly="true">
+      <xsd:simpleType>
+        <xsd:restriction base="dms:Note">
+          <xsd:maxLength value="255"/>
+        </xsd:restriction>
+      </xsd:simpleType>
+    </xsd:element>
+    <xsd:element name="MediaServiceGenerationTime" ma:index="11" nillable="true" ma:displayName="MediaServiceGenerationTime" ma:hidden="true" ma:internalName="MediaServiceGenerationTime" ma:readOnly="true">
+      <xsd:simpleType>
+        <xsd:restriction base="dms:Text"/>
+      </xsd:simpleType>
+    </xsd:element>
+    <xsd:element name="MediaServiceEventHashCode" ma:index="12" nillable="true" ma:displayName="MediaServiceEventHashCode" ma:hidden="true" ma:internalName="MediaServiceEventHashCode" ma:readOnly="true">
+      <xsd:simpleType>
+        <xsd:restriction base="dms:Text"/>
+      </xsd:simpleType>
+    </xsd:element>
+    <xsd:element name="MediaServiceDateTaken" ma:index="15" nillable="true" ma:displayName="MediaServiceDateTaken" ma:hidden="true" ma:internalName="MediaServiceDateTaken" ma:readOnly="true">
+      <xsd:simpleType>
+        <xsd:restriction base="dms:Text"/>
+      </xsd:simpleType>
+    </xsd:element>
+    <xsd:element name="MediaServiceAutoKeyPoints" ma:index="16" nillable="true" ma:displayName="MediaServiceAutoKeyPoints" ma:hidden="true" ma:internalName="MediaServiceAutoKeyPoints" ma:readOnly="true">
+      <xsd:simpleType>
+        <xsd:restriction base="dms:Note"/>
+      </xsd:simpleType>
+    </xsd:element>
+    <xsd:element name="MediaServiceKeyPoints" ma:index="17" nillable="true" ma:displayName="KeyPoints" ma:internalName="MediaServiceKeyPoints" ma:readOnly="true">
+      <xsd:simpleType>
+        <xsd:restriction base="dms:Note">
+          <xsd:maxLength value="255"/>
+        </xsd:restriction>
+      </xsd:simpleType>
+    </xsd:element>
+    <xsd:element name="Speaker" ma:index="18" nillable="true" ma:displayName="Speaker" ma:format="Dropdown" ma:list="UserInfo" ma:SharePointGroup="0" ma:internalName="Speaker">
+      <xsd:complexType>
+        <xsd:complexContent>
+          <xsd:extension base="dms:UserMulti">
+            <xsd:sequence>
+              <xsd:element name="UserInfo" minOccurs="0" maxOccurs="unbounded">
+                <xsd:complexType>
+                  <xsd:sequence>
+                    <xsd:element name="DisplayName" type="xsd:string" minOccurs="0"/>
+                    <xsd:element name="AccountId" type="dms:UserId" minOccurs="0" nillable="true"/>
+                    <xsd:element name="AccountType" type="xsd:string" minOccurs="0"/>
+                  </xsd:sequence>
+                </xsd:complexType>
+              </xsd:element>
+            </xsd:sequence>
+          </xsd:extension>
+        </xsd:complexContent>
+      </xsd:complexType>
+    </xsd:element>
+    <xsd:element name="Datum" ma:index="19" nillable="true" ma:displayName="Datum" ma:default="2021-01-02T00:00:00Z" ma:format="DateOnly" ma:internalName="Datum">
+      <xsd:simpleType>
+        <xsd:restriction base="dms:DateTime"/>
+      </xsd:simpleType>
+    </xsd:element>
+    <xsd:element name="_Flow_SignoffStatus" ma:index="20" nillable="true" ma:displayName="Status Unterschrift" ma:internalName="Status_x0020_Unterschrift">
+      <xsd:simpleType>
+        <xsd:restriction base="dms:Text"/>
+      </xsd:simpleType>
+    </xsd:element>
+    <xsd:element name="MediaLengthInSeconds" ma:index="21" nillable="true" ma:displayName="Length (seconds)" ma:internalName="MediaLengthInSeconds" ma:readOnly="true">
+      <xsd:simpleType>
+        <xsd:restriction base="dms:Unknown"/>
+      </xsd:simpleType>
+    </xsd:element>
+    <xsd:element name="MediaServiceLocation" ma:index="22" nillable="true" ma:displayName="Location" ma:internalName="MediaServiceLocation" ma:readOnly="true">
+      <xsd:simpleType>
+        <xsd:restriction base="dms:Text"/>
+      </xsd:simpleType>
+    </xsd:element>
+    <xsd:element name="lcf76f155ced4ddcb4097134ff3c332f" ma:index="24" nillable="true" ma:taxonomy="true" ma:internalName="lcf76f155ced4ddcb4097134ff3c332f" ma:taxonomyFieldName="MediaServiceImageTags" ma:displayName="Bildmarkierungen" ma:readOnly="false" ma:fieldId="{5cf76f15-5ced-4ddc-b409-7134ff3c332f}" ma:taxonomyMulti="true" ma:sspId="9a48e02a-304b-44db-a51f-647cba8d1c2e" ma:termSetId="09814cd3-568e-fe90-9814-8d621ff8fb84" ma:anchorId="fba54fb3-c3e1-fe81-a776-ca4b69148c4d" ma:open="true" ma:isKeyword="false">
+      <xsd:complexType>
+        <xsd:sequence>
+          <xsd:element ref="pc:Terms" minOccurs="0" maxOccurs="1"/>
+        </xsd:sequence>
+      </xsd:complexType>
+    </xsd:element>
+  </xsd:schema>
+  <xsd:schema xmlns:xsd="http://www.w3.org/2001/XMLSchema" xmlns:xs="http://www.w3.org/2001/XMLSchema" xmlns:dms="http://schemas.microsoft.com/office/2006/documentManagement/types" xmlns:pc="http://schemas.microsoft.com/office/infopath/2007/PartnerControls" targetNamespace="bd5c1ef4-a5a8-4f60-b734-518beb01c7b7" elementFormDefault="qualified">
+    <xsd:import namespace="http://schemas.microsoft.com/office/2006/documentManagement/types"/>
+    <xsd:import namespace="http://schemas.microsoft.com/office/infopath/2007/PartnerControls"/>
+    <xsd:element name="SharedWithUsers" ma:index="13" nillable="true" ma:displayName="Freigegeben für" ma:internalName="SharedWithUsers" ma:readOnly="true">
+      <xsd:complexType>
+        <xsd:complexContent>
+          <xsd:extension base="dms:UserMulti">
+            <xsd:sequence>
+              <xsd:element name="UserInfo" minOccurs="0" maxOccurs="unbounded">
+                <xsd:complexType>
+                  <xsd:sequence>
+                    <xsd:element name="DisplayName" type="xsd:string" minOccurs="0"/>
+                    <xsd:element name="AccountId" type="dms:UserId" minOccurs="0" nillable="true"/>
+                    <xsd:element name="AccountType" type="xsd:string" minOccurs="0"/>
+                  </xsd:sequence>
+                </xsd:complexType>
+              </xsd:element>
+            </xsd:sequence>
+          </xsd:extension>
+        </xsd:complexContent>
+      </xsd:complexType>
+    </xsd:element>
+    <xsd:element name="SharedWithDetails" ma:index="14" nillable="true" ma:displayName="Freigegeben für - Details" ma:internalName="SharedWithDetails" ma:readOnly="true">
+      <xsd:simpleType>
+        <xsd:restriction base="dms:Note">
+          <xsd:maxLength value="255"/>
+        </xsd:restriction>
+      </xsd:simpleType>
+    </xsd:element>
+    <xsd:element name="TaxCatchAll" ma:index="25" nillable="true" ma:displayName="Taxonomy Catch All Column" ma:hidden="true" ma:list="{8c5dfd34-6cc8-4139-8954-d3e7e36d7eca}" ma:internalName="TaxCatchAll" ma:showField="CatchAllData" ma:web="bd5c1ef4-a5a8-4f60-b734-518beb01c7b7">
+      <xsd:complexType>
+        <xsd:complexContent>
+          <xsd:extension base="dms:MultiChoiceLookup">
+            <xsd:sequence>
+              <xsd:element name="Value" type="dms:Lookup" maxOccurs="unbounded" minOccurs="0" nillable="true"/>
+            </xsd:sequence>
+          </xsd:extension>
+        </xsd:complexContent>
+      </xsd:complexType>
+    </xsd:element>
+  </xsd:schema>
+  <xsd:schema xmlns="http://schemas.openxmlformats.org/package/2006/metadata/core-properties" xmlns:xsd="http://www.w3.org/2001/XMLSchema" xmlns:xsi="http://www.w3.org/2001/XMLSchema-instance" xmlns:dc="http://purl.org/dc/elements/1.1/" xmlns:dcterms="http://purl.org/dc/terms/" xmlns:odoc="http://schemas.microsoft.com/internal/obd" targetNamespace="http://schemas.openxmlformats.org/package/2006/metadata/core-properties" elementFormDefault="qualified" attributeFormDefault="unqualified" blockDefault="#all">
+    <xsd:import namespace="http://purl.org/dc/elements/1.1/" schemaLocation="http://dublincore.org/schemas/xmls/qdc/2003/04/02/dc.xsd"/>
+    <xsd:import namespace="http://purl.org/dc/terms/" schemaLocation="http://dublincore.org/schemas/xmls/qdc/2003/04/02/dcterms.xsd"/>
+    <xsd:element name="coreProperties" type="CT_coreProperties"/>
+    <xsd:complexType name="CT_coreProperties">
+      <xsd:all>
+        <xsd:element ref="dc:creator" minOccurs="0" maxOccurs="1"/>
+        <xsd:element ref="dcterms:created" minOccurs="0" maxOccurs="1"/>
+        <xsd:element ref="dc:identifier" minOccurs="0" maxOccurs="1"/>
+        <xsd:element name="contentType" minOccurs="0" maxOccurs="1" type="xsd:string" ma:index="0" ma:displayName="Inhaltstyp"/>
+        <xsd:element ref="dc:title" minOccurs="0" maxOccurs="1" ma:index="4" ma:displayName="Titel"/>
+        <xsd:element ref="dc:subject" minOccurs="0" maxOccurs="1"/>
+        <xsd:element ref="dc:description" minOccurs="0" maxOccurs="1"/>
+        <xsd:element name="keywords" minOccurs="0" maxOccurs="1" type="xsd:string"/>
+        <xsd:element ref="dc:language" minOccurs="0" maxOccurs="1"/>
+        <xsd:element name="category" minOccurs="0" maxOccurs="1" type="xsd:string"/>
+        <xsd:element name="version" minOccurs="0" maxOccurs="1" type="xsd:string"/>
+        <xsd:element name="revision" minOccurs="0" maxOccurs="1" type="xsd:string">
+          <xsd:annotation>
+            <xsd:documentation>
+                        This value indicates the number of saves or revisions. The application is responsible for updating this value after each revision.
+                    </xsd:documentation>
+          </xsd:annotation>
+        </xsd:element>
+        <xsd:element name="lastModifiedBy" minOccurs="0" maxOccurs="1" type="xsd:string"/>
+        <xsd:element ref="dcterms:modified" minOccurs="0" maxOccurs="1"/>
+        <xsd:element name="contentStatus" minOccurs="0" maxOccurs="1" type="xsd:string"/>
+      </xsd:all>
+    </xsd:complexType>
+  </xsd:schema>
+  <xs:schema xmlns:pc="http://schemas.microsoft.com/office/infopath/2007/PartnerControls" xmlns:xs="http://www.w3.org/2001/XMLSchema" targetNamespace="http://schemas.microsoft.com/office/infopath/2007/PartnerControls" elementFormDefault="qualified" attributeFormDefault="unqualified">
+    <xs:element name="Person">
+      <xs:complexType>
+        <xs:sequence>
+          <xs:element ref="pc:DisplayName" minOccurs="0"/>
+          <xs:element ref="pc:AccountId" minOccurs="0"/>
+          <xs:element ref="pc:AccountType" minOccurs="0"/>
+        </xs:sequence>
+      </xs:complexType>
+    </xs:element>
+    <xs:element name="DisplayName" type="xs:string"/>
+    <xs:element name="AccountId" type="xs:string"/>
+    <xs:element name="AccountType" type="xs:string"/>
+    <xs:element name="BDCAssociatedEntity">
+      <xs:complexType>
+        <xs:sequence>
+          <xs:element ref="pc:BDCEntity" minOccurs="0" maxOccurs="unbounded"/>
+        </xs:sequence>
+        <xs:attribute ref="pc:EntityNamespace"/>
+        <xs:attribute ref="pc:EntityName"/>
+        <xs:attribute ref="pc:SystemInstanceName"/>
+        <xs:attribute ref="pc:AssociationName"/>
+      </xs:complexType>
+    </xs:element>
+    <xs:attribute name="EntityNamespace" type="xs:string"/>
+    <xs:attribute name="EntityName" type="xs:string"/>
+    <xs:attribute name="SystemInstanceName" type="xs:string"/>
+    <xs:attribute name="AssociationName" type="xs:string"/>
+    <xs:element name="BDCEntity">
+      <xs:complexType>
+        <xs:sequence>
+          <xs:element ref="pc:EntityDisplayName" minOccurs="0"/>
+          <xs:element ref="pc:EntityInstanceReference" minOccurs="0"/>
+          <xs:element ref="pc:EntityId1" minOccurs="0"/>
+          <xs:element ref="pc:EntityId2" minOccurs="0"/>
+          <xs:element ref="pc:EntityId3" minOccurs="0"/>
+          <xs:element ref="pc:EntityId4" minOccurs="0"/>
+          <xs:element ref="pc:EntityId5" minOccurs="0"/>
+        </xs:sequence>
+      </xs:complexType>
+    </xs:element>
+    <xs:element name="EntityDisplayName" type="xs:string"/>
+    <xs:element name="EntityInstanceReference" type="xs:string"/>
+    <xs:element name="EntityId1" type="xs:string"/>
+    <xs:element name="EntityId2" type="xs:string"/>
+    <xs:element name="EntityId3" type="xs:string"/>
+    <xs:element name="EntityId4" type="xs:string"/>
+    <xs:element name="EntityId5" type="xs:string"/>
+    <xs:element name="Terms">
+      <xs:complexType>
+        <xs:sequence>
+          <xs:element ref="pc:TermInfo" minOccurs="0" maxOccurs="unbounded"/>
+        </xs:sequence>
+      </xs:complexType>
+    </xs:element>
+    <xs:element name="TermInfo">
+      <xs:complexType>
+        <xs:sequence>
+          <xs:element ref="pc:TermName" minOccurs="0"/>
+          <xs:element ref="pc:TermId" minOccurs="0"/>
+        </xs:sequence>
+      </xs:complexType>
+    </xs:element>
+    <xs:element name="TermName" type="xs:string"/>
+    <xs:element name="TermId" type="xs:string"/>
+  </xs:schema>
+</ct:contentTypeSchema>
+</file>
+
+<file path=customXml/item3.xml><?xml version="1.0" encoding="utf-8"?>
+<?mso-contentType ?>
+<FormTemplates xmlns="http://schemas.microsoft.com/sharepoint/v3/contenttype/forms">
+  <Display>DocumentLibraryForm</Display>
+  <Edit>DocumentLibraryForm</Edit>
+  <New>DocumentLibraryForm</New>
+</FormTemplates>
+</file>
+
+<file path=customXml/itemProps1.xml><?xml version="1.0" encoding="utf-8"?>
+<ds:datastoreItem xmlns:ds="http://schemas.openxmlformats.org/officeDocument/2006/customXml" ds:itemID="{88383E14-D3F5-4842-8B29-BAFB3C36CDD1}">
+  <ds:schemaRefs>
+    <ds:schemaRef ds:uri="http://schemas.microsoft.com/office/2006/metadata/properties"/>
+    <ds:schemaRef ds:uri="http://schemas.microsoft.com/office/infopath/2007/PartnerControls"/>
+    <ds:schemaRef ds:uri="9a7d57e2-a6f6-4353-bdc3-995d0b2e54a4"/>
+    <ds:schemaRef ds:uri="bd5c1ef4-a5a8-4f60-b734-518beb01c7b7"/>
+  </ds:schemaRefs>
+</ds:datastoreItem>
+</file>
+
+<file path=customXml/itemProps2.xml><?xml version="1.0" encoding="utf-8"?>
+<ds:datastoreItem xmlns:ds="http://schemas.openxmlformats.org/officeDocument/2006/customXml" ds:itemID="{F771DBB5-34B1-45AF-AE9A-E95047E5E2F8}">
+  <ds:schemaRefs>
+    <ds:schemaRef ds:uri="http://schemas.microsoft.com/office/2006/metadata/contentType"/>
+    <ds:schemaRef ds:uri="http://schemas.microsoft.com/office/2006/metadata/properties/metaAttributes"/>
+    <ds:schemaRef ds:uri="http://www.w3.org/2001/XMLSchema"/>
+    <ds:schemaRef ds:uri="http://schemas.microsoft.com/office/2006/metadata/properties"/>
+    <ds:schemaRef ds:uri="9a7d57e2-a6f6-4353-bdc3-995d0b2e54a4"/>
+    <ds:schemaRef ds:uri="bd5c1ef4-a5a8-4f60-b734-518beb01c7b7"/>
+    <ds:schemaRef ds:uri="http://schemas.microsoft.com/office/2006/documentManagement/types"/>
+    <ds:schemaRef ds:uri="http://schemas.microsoft.com/office/infopath/2007/PartnerControls"/>
+    <ds:schemaRef ds:uri="http://schemas.openxmlformats.org/package/2006/metadata/core-properties"/>
+    <ds:schemaRef ds:uri="http://purl.org/dc/elements/1.1/"/>
+    <ds:schemaRef ds:uri="http://purl.org/dc/terms/"/>
+    <ds:schemaRef ds:uri="http://schemas.microsoft.com/internal/obd"/>
+  </ds:schemaRefs>
+</ds:datastoreItem>
+</file>
+
+<file path=customXml/itemProps3.xml><?xml version="1.0" encoding="utf-8"?>
+<ds:datastoreItem xmlns:ds="http://schemas.openxmlformats.org/officeDocument/2006/customXml" ds:itemID="{B9D2EB95-46D4-4E72-8605-AD808543CAA3}">
+  <ds:schemaRefs>
+    <ds:schemaRef ds:uri="http://schemas.microsoft.com/sharepoint/v3/contenttype/forms"/>
+  </ds:schemaRefs>
+</ds:datastoreItem>
 </file>
</xml_diff>